<commit_message>
STU 2 updates for use case, specification, composition
</commit_message>
<xml_diff>
--- a/input/images-source/ccrr-ig-diagrams.pptx
+++ b/input/images-source/ccrr-ig-diagrams.pptx
@@ -6,7 +6,7 @@
     <p:sldMasterId id="2147483674" r:id="rId2"/>
   </p:sldMasterIdLst>
   <p:notesMasterIdLst>
-    <p:notesMasterId r:id="rId9"/>
+    <p:notesMasterId r:id="rId10"/>
   </p:notesMasterIdLst>
   <p:sldIdLst>
     <p:sldId id="2456" r:id="rId3"/>
@@ -15,6 +15,7 @@
     <p:sldId id="259" r:id="rId6"/>
     <p:sldId id="2454" r:id="rId7"/>
     <p:sldId id="2455" r:id="rId8"/>
+    <p:sldId id="263" r:id="rId9"/>
   </p:sldIdLst>
   <p:sldSz cx="12192000" cy="6858000"/>
   <p:notesSz cx="6858000" cy="9144000"/>
@@ -203,7 +204,7 @@
           <a:p>
             <a:fld id="{AB97FB07-E237-456B-A4F0-F2C4672E0DE9}" type="datetimeFigureOut">
               <a:rPr lang="en-US" smtClean="0"/>
-              <a:t>8/14/2025</a:t>
+              <a:t>9/10/2025</a:t>
             </a:fld>
             <a:endParaRPr lang="en-US"/>
           </a:p>
@@ -1087,6 +1088,150 @@
 </p:notes>
 </file>
 
+<file path=ppt/notesSlides/notesSlide5.xml><?xml version="1.0" encoding="utf-8"?>
+<p:notes xmlns:a="http://schemas.openxmlformats.org/drawingml/2006/main" xmlns:r="http://schemas.openxmlformats.org/officeDocument/2006/relationships" xmlns:p="http://schemas.openxmlformats.org/presentationml/2006/main">
+  <p:cSld>
+    <p:spTree>
+      <p:nvGrpSpPr>
+        <p:cNvPr id="1" name=""/>
+        <p:cNvGrpSpPr/>
+        <p:nvPr/>
+      </p:nvGrpSpPr>
+      <p:grpSpPr>
+        <a:xfrm>
+          <a:off x="0" y="0"/>
+          <a:ext cx="0" cy="0"/>
+          <a:chOff x="0" y="0"/>
+          <a:chExt cx="0" cy="0"/>
+        </a:xfrm>
+      </p:grpSpPr>
+      <p:sp>
+        <p:nvSpPr>
+          <p:cNvPr id="2" name="Slide Image Placeholder 1"/>
+          <p:cNvSpPr>
+            <a:spLocks noGrp="1" noRot="1" noChangeAspect="1"/>
+          </p:cNvSpPr>
+          <p:nvPr>
+            <p:ph type="sldImg"/>
+          </p:nvPr>
+        </p:nvSpPr>
+        <p:spPr/>
+      </p:sp>
+      <p:sp>
+        <p:nvSpPr>
+          <p:cNvPr id="3" name="Notes Placeholder 2"/>
+          <p:cNvSpPr>
+            <a:spLocks noGrp="1"/>
+          </p:cNvSpPr>
+          <p:nvPr>
+            <p:ph type="body" idx="1"/>
+          </p:nvPr>
+        </p:nvSpPr>
+        <p:spPr/>
+        <p:txBody>
+          <a:bodyPr/>
+          <a:lstStyle/>
+          <a:p>
+            <a:endParaRPr lang="en-US" dirty="0"/>
+          </a:p>
+        </p:txBody>
+      </p:sp>
+      <p:sp>
+        <p:nvSpPr>
+          <p:cNvPr id="4" name="Slide Number Placeholder 3"/>
+          <p:cNvSpPr>
+            <a:spLocks noGrp="1"/>
+          </p:cNvSpPr>
+          <p:nvPr>
+            <p:ph type="sldNum" sz="quarter" idx="5"/>
+          </p:nvPr>
+        </p:nvSpPr>
+        <p:spPr/>
+        <p:txBody>
+          <a:bodyPr/>
+          <a:lstStyle/>
+          <a:p>
+            <a:pPr marL="0" marR="0" lvl="0" indent="0" algn="r" defTabSz="914400" rtl="0" eaLnBrk="1" fontAlgn="auto" latinLnBrk="0" hangingPunct="1">
+              <a:lnSpc>
+                <a:spcPct val="100000"/>
+              </a:lnSpc>
+              <a:spcBef>
+                <a:spcPts val="0"/>
+              </a:spcBef>
+              <a:spcAft>
+                <a:spcPts val="0"/>
+              </a:spcAft>
+              <a:buClrTx/>
+              <a:buSzTx/>
+              <a:buFontTx/>
+              <a:buNone/>
+              <a:tabLst/>
+              <a:defRPr/>
+            </a:pPr>
+            <a:fld id="{7B5BCFED-F310-6345-AB19-EBBEF8BF5E99}" type="slidenum">
+              <a:rPr kumimoji="0" lang="en-US" sz="1200" b="0" i="0" u="none" strike="noStrike" kern="1200" cap="none" spc="0" normalizeH="0" baseline="0" noProof="0" smtClean="0">
+                <a:ln>
+                  <a:noFill/>
+                </a:ln>
+                <a:solidFill>
+                  <a:prstClr val="black"/>
+                </a:solidFill>
+                <a:effectLst/>
+                <a:uLnTx/>
+                <a:uFillTx/>
+                <a:latin typeface="Calibri" panose="020F0502020204030204"/>
+                <a:ea typeface="+mn-ea"/>
+                <a:cs typeface="+mn-cs"/>
+              </a:rPr>
+              <a:pPr marL="0" marR="0" lvl="0" indent="0" algn="r" defTabSz="914400" rtl="0" eaLnBrk="1" fontAlgn="auto" latinLnBrk="0" hangingPunct="1">
+                <a:lnSpc>
+                  <a:spcPct val="100000"/>
+                </a:lnSpc>
+                <a:spcBef>
+                  <a:spcPts val="0"/>
+                </a:spcBef>
+                <a:spcAft>
+                  <a:spcPts val="0"/>
+                </a:spcAft>
+                <a:buClrTx/>
+                <a:buSzTx/>
+                <a:buFontTx/>
+                <a:buNone/>
+                <a:tabLst/>
+                <a:defRPr/>
+              </a:pPr>
+              <a:t>7</a:t>
+            </a:fld>
+            <a:endParaRPr kumimoji="0" lang="en-US" sz="1200" b="0" i="0" u="none" strike="noStrike" kern="1200" cap="none" spc="0" normalizeH="0" baseline="0" noProof="0">
+              <a:ln>
+                <a:noFill/>
+              </a:ln>
+              <a:solidFill>
+                <a:prstClr val="black"/>
+              </a:solidFill>
+              <a:effectLst/>
+              <a:uLnTx/>
+              <a:uFillTx/>
+              <a:latin typeface="Calibri" panose="020F0502020204030204"/>
+              <a:ea typeface="+mn-ea"/>
+              <a:cs typeface="+mn-cs"/>
+            </a:endParaRPr>
+          </a:p>
+        </p:txBody>
+      </p:sp>
+    </p:spTree>
+    <p:extLst>
+      <p:ext uri="{BB962C8B-B14F-4D97-AF65-F5344CB8AC3E}">
+        <p14:creationId xmlns:p14="http://schemas.microsoft.com/office/powerpoint/2010/main" val="1394378231"/>
+      </p:ext>
+    </p:extLst>
+  </p:cSld>
+  <p:clrMapOvr>
+    <a:masterClrMapping/>
+  </p:clrMapOvr>
+</p:notes>
+</file>
+
 <file path=ppt/slideLayouts/slideLayout1.xml><?xml version="1.0" encoding="utf-8"?>
 <p:sldLayout xmlns:a="http://schemas.openxmlformats.org/drawingml/2006/main" xmlns:r="http://schemas.openxmlformats.org/officeDocument/2006/relationships" xmlns:p="http://schemas.openxmlformats.org/presentationml/2006/main" preserve="1">
   <p:cSld name="Title Slide">
@@ -1876,7 +2021,7 @@
                 <a:latin typeface="Constantia"/>
               </a:rPr>
               <a:pPr/>
-              <a:t>8/14/2025</a:t>
+              <a:t>9/10/2025</a:t>
             </a:fld>
             <a:endParaRPr lang="en-US" dirty="0">
               <a:latin typeface="Constantia"/>
@@ -2111,7 +2256,7 @@
                 <a:latin typeface="Constantia"/>
               </a:rPr>
               <a:pPr/>
-              <a:t>8/14/2025</a:t>
+              <a:t>9/10/2025</a:t>
             </a:fld>
             <a:endParaRPr lang="en-US" dirty="0">
               <a:latin typeface="Constantia"/>
@@ -2319,7 +2464,7 @@
                 <a:latin typeface="Constantia"/>
               </a:rPr>
               <a:pPr/>
-              <a:t>8/14/2025</a:t>
+              <a:t>9/10/2025</a:t>
             </a:fld>
             <a:endParaRPr lang="en-US" dirty="0">
               <a:latin typeface="Constantia"/>
@@ -2627,7 +2772,7 @@
           <a:p>
             <a:fld id="{5F6B6B97-D1D7-444D-A37B-F21E0BA680D2}" type="datetimeFigureOut">
               <a:rPr lang="en-US" smtClean="0"/>
-              <a:t>8/14/2025</a:t>
+              <a:t>9/10/2025</a:t>
             </a:fld>
             <a:endParaRPr lang="en-US"/>
           </a:p>
@@ -2825,7 +2970,7 @@
           <a:p>
             <a:fld id="{5F6B6B97-D1D7-444D-A37B-F21E0BA680D2}" type="datetimeFigureOut">
               <a:rPr lang="en-US" smtClean="0"/>
-              <a:t>8/14/2025</a:t>
+              <a:t>9/10/2025</a:t>
             </a:fld>
             <a:endParaRPr lang="en-US"/>
           </a:p>
@@ -3100,7 +3245,7 @@
           <a:p>
             <a:fld id="{5F6B6B97-D1D7-444D-A37B-F21E0BA680D2}" type="datetimeFigureOut">
               <a:rPr lang="en-US" smtClean="0"/>
-              <a:t>8/14/2025</a:t>
+              <a:t>9/10/2025</a:t>
             </a:fld>
             <a:endParaRPr lang="en-US"/>
           </a:p>
@@ -3365,7 +3510,7 @@
           <a:p>
             <a:fld id="{5F6B6B97-D1D7-444D-A37B-F21E0BA680D2}" type="datetimeFigureOut">
               <a:rPr lang="en-US" smtClean="0"/>
-              <a:t>8/14/2025</a:t>
+              <a:t>9/10/2025</a:t>
             </a:fld>
             <a:endParaRPr lang="en-US"/>
           </a:p>
@@ -3777,7 +3922,7 @@
           <a:p>
             <a:fld id="{5F6B6B97-D1D7-444D-A37B-F21E0BA680D2}" type="datetimeFigureOut">
               <a:rPr lang="en-US" smtClean="0"/>
-              <a:t>8/14/2025</a:t>
+              <a:t>9/10/2025</a:t>
             </a:fld>
             <a:endParaRPr lang="en-US"/>
           </a:p>
@@ -3918,7 +4063,7 @@
           <a:p>
             <a:fld id="{5F6B6B97-D1D7-444D-A37B-F21E0BA680D2}" type="datetimeFigureOut">
               <a:rPr lang="en-US" smtClean="0"/>
-              <a:t>8/14/2025</a:t>
+              <a:t>9/10/2025</a:t>
             </a:fld>
             <a:endParaRPr lang="en-US"/>
           </a:p>
@@ -4054,7 +4199,7 @@
                 <a:latin typeface="Constantia"/>
               </a:rPr>
               <a:pPr/>
-              <a:t>8/14/2025</a:t>
+              <a:t>9/10/2025</a:t>
             </a:fld>
             <a:endParaRPr lang="en-US" dirty="0">
               <a:latin typeface="Constantia"/>
@@ -4176,7 +4321,7 @@
           <a:p>
             <a:fld id="{5F6B6B97-D1D7-444D-A37B-F21E0BA680D2}" type="datetimeFigureOut">
               <a:rPr lang="en-US" smtClean="0"/>
-              <a:t>8/14/2025</a:t>
+              <a:t>9/10/2025</a:t>
             </a:fld>
             <a:endParaRPr lang="en-US"/>
           </a:p>
@@ -4487,7 +4632,7 @@
           <a:p>
             <a:fld id="{5F6B6B97-D1D7-444D-A37B-F21E0BA680D2}" type="datetimeFigureOut">
               <a:rPr lang="en-US" smtClean="0"/>
-              <a:t>8/14/2025</a:t>
+              <a:t>9/10/2025</a:t>
             </a:fld>
             <a:endParaRPr lang="en-US"/>
           </a:p>
@@ -4775,7 +4920,7 @@
           <a:p>
             <a:fld id="{5F6B6B97-D1D7-444D-A37B-F21E0BA680D2}" type="datetimeFigureOut">
               <a:rPr lang="en-US" smtClean="0"/>
-              <a:t>8/14/2025</a:t>
+              <a:t>9/10/2025</a:t>
             </a:fld>
             <a:endParaRPr lang="en-US"/>
           </a:p>
@@ -4973,7 +5118,7 @@
           <a:p>
             <a:fld id="{5F6B6B97-D1D7-444D-A37B-F21E0BA680D2}" type="datetimeFigureOut">
               <a:rPr lang="en-US" smtClean="0"/>
-              <a:t>8/14/2025</a:t>
+              <a:t>9/10/2025</a:t>
             </a:fld>
             <a:endParaRPr lang="en-US"/>
           </a:p>
@@ -5181,7 +5326,7 @@
           <a:p>
             <a:fld id="{5F6B6B97-D1D7-444D-A37B-F21E0BA680D2}" type="datetimeFigureOut">
               <a:rPr lang="en-US" smtClean="0"/>
-              <a:t>8/14/2025</a:t>
+              <a:t>9/10/2025</a:t>
             </a:fld>
             <a:endParaRPr lang="en-US"/>
           </a:p>
@@ -5409,7 +5554,7 @@
                 <a:latin typeface="Constantia"/>
               </a:rPr>
               <a:pPr/>
-              <a:t>8/14/2025</a:t>
+              <a:t>9/10/2025</a:t>
             </a:fld>
             <a:endParaRPr lang="en-US" dirty="0">
               <a:latin typeface="Constantia"/>
@@ -5711,7 +5856,7 @@
                 <a:latin typeface="Constantia"/>
               </a:rPr>
               <a:pPr/>
-              <a:t>8/14/2025</a:t>
+              <a:t>9/10/2025</a:t>
             </a:fld>
             <a:endParaRPr lang="en-US" dirty="0">
               <a:latin typeface="Constantia"/>
@@ -6122,7 +6267,7 @@
                 <a:latin typeface="Constantia"/>
               </a:rPr>
               <a:pPr/>
-              <a:t>8/14/2025</a:t>
+              <a:t>9/10/2025</a:t>
             </a:fld>
             <a:endParaRPr lang="en-US" dirty="0">
               <a:latin typeface="Constantia"/>
@@ -6305,7 +6450,7 @@
                 <a:latin typeface="Constantia"/>
               </a:rPr>
               <a:pPr/>
-              <a:t>8/14/2025</a:t>
+              <a:t>9/10/2025</a:t>
             </a:fld>
             <a:endParaRPr lang="en-US" dirty="0">
               <a:latin typeface="Constantia"/>
@@ -6428,7 +6573,7 @@
                 <a:latin typeface="Constantia"/>
               </a:rPr>
               <a:pPr/>
-              <a:t>8/14/2025</a:t>
+              <a:t>9/10/2025</a:t>
             </a:fld>
             <a:endParaRPr lang="en-US" dirty="0">
               <a:latin typeface="Constantia"/>
@@ -6577,7 +6722,7 @@
                 <a:latin typeface="Constantia"/>
               </a:rPr>
               <a:pPr/>
-              <a:t>8/14/2025</a:t>
+              <a:t>9/10/2025</a:t>
             </a:fld>
             <a:endParaRPr lang="en-US" dirty="0">
               <a:latin typeface="Constantia"/>
@@ -6903,7 +7048,7 @@
                 <a:latin typeface="Constantia"/>
               </a:rPr>
               <a:pPr/>
-              <a:t>8/14/2025</a:t>
+              <a:t>9/10/2025</a:t>
             </a:fld>
             <a:endParaRPr lang="en-US" dirty="0">
               <a:latin typeface="Constantia"/>
@@ -7158,7 +7303,7 @@
             <a:fld id="{B0F76EF8-0209-C949-9DAA-A21557B1487A}" type="datetimeFigureOut">
               <a:rPr lang="en-US" smtClean="0"/>
               <a:pPr defTabSz="457189"/>
-              <a:t>8/14/2025</a:t>
+              <a:t>9/10/2025</a:t>
             </a:fld>
             <a:endParaRPr lang="en-US" dirty="0"/>
           </a:p>
@@ -7875,7 +8020,7 @@
           <a:p>
             <a:fld id="{5F6B6B97-D1D7-444D-A37B-F21E0BA680D2}" type="datetimeFigureOut">
               <a:rPr lang="en-US" smtClean="0"/>
-              <a:t>8/14/2025</a:t>
+              <a:t>9/10/2025</a:t>
             </a:fld>
             <a:endParaRPr lang="en-US"/>
           </a:p>
@@ -21804,6 +21949,3252 @@
 </p:sld>
 </file>
 
+<file path=ppt/slides/slide7.xml><?xml version="1.0" encoding="utf-8"?>
+<p:sld xmlns:a="http://schemas.openxmlformats.org/drawingml/2006/main" xmlns:r="http://schemas.openxmlformats.org/officeDocument/2006/relationships" xmlns:p="http://schemas.openxmlformats.org/presentationml/2006/main">
+  <p:cSld>
+    <p:spTree>
+      <p:nvGrpSpPr>
+        <p:cNvPr id="1" name=""/>
+        <p:cNvGrpSpPr/>
+        <p:nvPr/>
+      </p:nvGrpSpPr>
+      <p:grpSpPr>
+        <a:xfrm>
+          <a:off x="0" y="0"/>
+          <a:ext cx="0" cy="0"/>
+          <a:chOff x="0" y="0"/>
+          <a:chExt cx="0" cy="0"/>
+        </a:xfrm>
+      </p:grpSpPr>
+      <p:cxnSp>
+        <p:nvCxnSpPr>
+          <p:cNvPr id="82" name="Straight Arrow Connector 81">
+            <a:extLst>
+              <a:ext uri="{FF2B5EF4-FFF2-40B4-BE49-F238E27FC236}">
+                <a16:creationId xmlns:a16="http://schemas.microsoft.com/office/drawing/2014/main" id="{EA93E8AC-1642-0856-7B4B-9BC2FBB3A495}"/>
+              </a:ext>
+            </a:extLst>
+          </p:cNvPr>
+          <p:cNvCxnSpPr>
+            <a:cxnSpLocks/>
+            <a:stCxn id="97" idx="2"/>
+            <a:endCxn id="107" idx="0"/>
+          </p:cNvCxnSpPr>
+          <p:nvPr/>
+        </p:nvCxnSpPr>
+        <p:spPr>
+          <a:xfrm flipH="1">
+            <a:off x="7020491" y="3377446"/>
+            <a:ext cx="19736" cy="1530698"/>
+          </a:xfrm>
+          <a:prstGeom prst="straightConnector1">
+            <a:avLst/>
+          </a:prstGeom>
+          <a:ln w="6350">
+            <a:solidFill>
+              <a:schemeClr val="accent6"/>
+            </a:solidFill>
+            <a:prstDash val="solid"/>
+            <a:headEnd type="triangle"/>
+            <a:tailEnd type="none"/>
+          </a:ln>
+        </p:spPr>
+        <p:style>
+          <a:lnRef idx="1">
+            <a:schemeClr val="accent1"/>
+          </a:lnRef>
+          <a:fillRef idx="0">
+            <a:schemeClr val="accent1"/>
+          </a:fillRef>
+          <a:effectRef idx="0">
+            <a:schemeClr val="accent1"/>
+          </a:effectRef>
+          <a:fontRef idx="minor">
+            <a:schemeClr val="tx1"/>
+          </a:fontRef>
+        </p:style>
+      </p:cxnSp>
+      <p:cxnSp>
+        <p:nvCxnSpPr>
+          <p:cNvPr id="81" name="Straight Arrow Connector 80">
+            <a:extLst>
+              <a:ext uri="{FF2B5EF4-FFF2-40B4-BE49-F238E27FC236}">
+                <a16:creationId xmlns:a16="http://schemas.microsoft.com/office/drawing/2014/main" id="{EF029852-4147-589C-9189-0B25B5A8A7C9}"/>
+              </a:ext>
+            </a:extLst>
+          </p:cNvPr>
+          <p:cNvCxnSpPr>
+            <a:cxnSpLocks/>
+            <a:stCxn id="95" idx="2"/>
+            <a:endCxn id="106" idx="0"/>
+          </p:cNvCxnSpPr>
+          <p:nvPr/>
+        </p:nvCxnSpPr>
+        <p:spPr>
+          <a:xfrm>
+            <a:off x="4912574" y="3372183"/>
+            <a:ext cx="5980" cy="1535961"/>
+          </a:xfrm>
+          <a:prstGeom prst="straightConnector1">
+            <a:avLst/>
+          </a:prstGeom>
+          <a:ln w="6350">
+            <a:solidFill>
+              <a:schemeClr val="accent6"/>
+            </a:solidFill>
+            <a:prstDash val="solid"/>
+            <a:headEnd type="triangle"/>
+            <a:tailEnd type="none"/>
+          </a:ln>
+        </p:spPr>
+        <p:style>
+          <a:lnRef idx="1">
+            <a:schemeClr val="accent1"/>
+          </a:lnRef>
+          <a:fillRef idx="0">
+            <a:schemeClr val="accent1"/>
+          </a:fillRef>
+          <a:effectRef idx="0">
+            <a:schemeClr val="accent1"/>
+          </a:effectRef>
+          <a:fontRef idx="minor">
+            <a:schemeClr val="tx1"/>
+          </a:fontRef>
+        </p:style>
+      </p:cxnSp>
+      <p:grpSp>
+        <p:nvGrpSpPr>
+          <p:cNvPr id="59" name="Group 58">
+            <a:extLst>
+              <a:ext uri="{FF2B5EF4-FFF2-40B4-BE49-F238E27FC236}">
+                <a16:creationId xmlns:a16="http://schemas.microsoft.com/office/drawing/2014/main" id="{255F4E8E-E045-7713-2A5A-DEECB3106B6D}"/>
+              </a:ext>
+            </a:extLst>
+          </p:cNvPr>
+          <p:cNvGrpSpPr/>
+          <p:nvPr/>
+        </p:nvGrpSpPr>
+        <p:grpSpPr>
+          <a:xfrm>
+            <a:off x="306820" y="4854584"/>
+            <a:ext cx="10588154" cy="708292"/>
+            <a:chOff x="306820" y="5393064"/>
+            <a:chExt cx="10588154" cy="708292"/>
+          </a:xfrm>
+        </p:grpSpPr>
+        <p:cxnSp>
+          <p:nvCxnSpPr>
+            <p:cNvPr id="232" name="Straight Connector 231">
+              <a:extLst>
+                <a:ext uri="{FF2B5EF4-FFF2-40B4-BE49-F238E27FC236}">
+                  <a16:creationId xmlns:a16="http://schemas.microsoft.com/office/drawing/2014/main" id="{F56B2135-3DE6-BDA5-EBA5-2DBEF1320B21}"/>
+                </a:ext>
+              </a:extLst>
+            </p:cNvPr>
+            <p:cNvCxnSpPr>
+              <a:cxnSpLocks/>
+            </p:cNvCxnSpPr>
+            <p:nvPr/>
+          </p:nvCxnSpPr>
+          <p:spPr>
+            <a:xfrm>
+              <a:off x="2424451" y="5393064"/>
+              <a:ext cx="0" cy="399013"/>
+            </a:xfrm>
+            <a:prstGeom prst="line">
+              <a:avLst/>
+            </a:prstGeom>
+            <a:ln w="50800">
+              <a:solidFill>
+                <a:schemeClr val="tx1"/>
+              </a:solidFill>
+            </a:ln>
+          </p:spPr>
+          <p:style>
+            <a:lnRef idx="1">
+              <a:schemeClr val="accent1"/>
+            </a:lnRef>
+            <a:fillRef idx="0">
+              <a:schemeClr val="accent1"/>
+            </a:fillRef>
+            <a:effectRef idx="0">
+              <a:schemeClr val="accent1"/>
+            </a:effectRef>
+            <a:fontRef idx="minor">
+              <a:schemeClr val="tx1"/>
+            </a:fontRef>
+          </p:style>
+        </p:cxnSp>
+        <p:cxnSp>
+          <p:nvCxnSpPr>
+            <p:cNvPr id="236" name="Straight Connector 235">
+              <a:extLst>
+                <a:ext uri="{FF2B5EF4-FFF2-40B4-BE49-F238E27FC236}">
+                  <a16:creationId xmlns:a16="http://schemas.microsoft.com/office/drawing/2014/main" id="{B2A1E5BA-84D4-F673-E495-0B4F2CC740F9}"/>
+                </a:ext>
+              </a:extLst>
+            </p:cNvPr>
+            <p:cNvCxnSpPr>
+              <a:cxnSpLocks/>
+            </p:cNvCxnSpPr>
+            <p:nvPr/>
+          </p:nvCxnSpPr>
+          <p:spPr>
+            <a:xfrm>
+              <a:off x="4542082" y="5393064"/>
+              <a:ext cx="0" cy="399013"/>
+            </a:xfrm>
+            <a:prstGeom prst="line">
+              <a:avLst/>
+            </a:prstGeom>
+            <a:ln w="50800">
+              <a:solidFill>
+                <a:schemeClr val="tx1"/>
+              </a:solidFill>
+            </a:ln>
+          </p:spPr>
+          <p:style>
+            <a:lnRef idx="1">
+              <a:schemeClr val="accent1"/>
+            </a:lnRef>
+            <a:fillRef idx="0">
+              <a:schemeClr val="accent1"/>
+            </a:fillRef>
+            <a:effectRef idx="0">
+              <a:schemeClr val="accent1"/>
+            </a:effectRef>
+            <a:fontRef idx="minor">
+              <a:schemeClr val="tx1"/>
+            </a:fontRef>
+          </p:style>
+        </p:cxnSp>
+        <p:cxnSp>
+          <p:nvCxnSpPr>
+            <p:cNvPr id="238" name="Straight Connector 237">
+              <a:extLst>
+                <a:ext uri="{FF2B5EF4-FFF2-40B4-BE49-F238E27FC236}">
+                  <a16:creationId xmlns:a16="http://schemas.microsoft.com/office/drawing/2014/main" id="{43B5EF8B-B489-3638-0BDE-31A26775CB66}"/>
+                </a:ext>
+              </a:extLst>
+            </p:cNvPr>
+            <p:cNvCxnSpPr>
+              <a:cxnSpLocks/>
+            </p:cNvCxnSpPr>
+            <p:nvPr/>
+          </p:nvCxnSpPr>
+          <p:spPr>
+            <a:xfrm>
+              <a:off x="6659713" y="5393064"/>
+              <a:ext cx="0" cy="399013"/>
+            </a:xfrm>
+            <a:prstGeom prst="line">
+              <a:avLst/>
+            </a:prstGeom>
+            <a:ln w="50800">
+              <a:solidFill>
+                <a:schemeClr val="tx1"/>
+              </a:solidFill>
+            </a:ln>
+          </p:spPr>
+          <p:style>
+            <a:lnRef idx="1">
+              <a:schemeClr val="accent1"/>
+            </a:lnRef>
+            <a:fillRef idx="0">
+              <a:schemeClr val="accent1"/>
+            </a:fillRef>
+            <a:effectRef idx="0">
+              <a:schemeClr val="accent1"/>
+            </a:effectRef>
+            <a:fontRef idx="minor">
+              <a:schemeClr val="tx1"/>
+            </a:fontRef>
+          </p:style>
+        </p:cxnSp>
+        <p:cxnSp>
+          <p:nvCxnSpPr>
+            <p:cNvPr id="239" name="Straight Connector 238">
+              <a:extLst>
+                <a:ext uri="{FF2B5EF4-FFF2-40B4-BE49-F238E27FC236}">
+                  <a16:creationId xmlns:a16="http://schemas.microsoft.com/office/drawing/2014/main" id="{708CE08F-8C05-58A4-5009-EAB5C864A1E5}"/>
+                </a:ext>
+              </a:extLst>
+            </p:cNvPr>
+            <p:cNvCxnSpPr>
+              <a:cxnSpLocks/>
+            </p:cNvCxnSpPr>
+            <p:nvPr/>
+          </p:nvCxnSpPr>
+          <p:spPr>
+            <a:xfrm>
+              <a:off x="8777344" y="5393064"/>
+              <a:ext cx="0" cy="399013"/>
+            </a:xfrm>
+            <a:prstGeom prst="line">
+              <a:avLst/>
+            </a:prstGeom>
+            <a:ln w="50800">
+              <a:solidFill>
+                <a:schemeClr val="tx1"/>
+              </a:solidFill>
+            </a:ln>
+          </p:spPr>
+          <p:style>
+            <a:lnRef idx="1">
+              <a:schemeClr val="accent1"/>
+            </a:lnRef>
+            <a:fillRef idx="0">
+              <a:schemeClr val="accent1"/>
+            </a:fillRef>
+            <a:effectRef idx="0">
+              <a:schemeClr val="accent1"/>
+            </a:effectRef>
+            <a:fontRef idx="minor">
+              <a:schemeClr val="tx1"/>
+            </a:fontRef>
+          </p:style>
+        </p:cxnSp>
+        <p:cxnSp>
+          <p:nvCxnSpPr>
+            <p:cNvPr id="240" name="Straight Connector 239">
+              <a:extLst>
+                <a:ext uri="{FF2B5EF4-FFF2-40B4-BE49-F238E27FC236}">
+                  <a16:creationId xmlns:a16="http://schemas.microsoft.com/office/drawing/2014/main" id="{4FBC8E5D-843E-B8E2-40D7-31A2C3C562E2}"/>
+                </a:ext>
+              </a:extLst>
+            </p:cNvPr>
+            <p:cNvCxnSpPr>
+              <a:cxnSpLocks/>
+            </p:cNvCxnSpPr>
+            <p:nvPr/>
+          </p:nvCxnSpPr>
+          <p:spPr>
+            <a:xfrm>
+              <a:off x="306820" y="5393064"/>
+              <a:ext cx="0" cy="399013"/>
+            </a:xfrm>
+            <a:prstGeom prst="line">
+              <a:avLst/>
+            </a:prstGeom>
+            <a:ln w="50800">
+              <a:solidFill>
+                <a:schemeClr val="tx1"/>
+              </a:solidFill>
+            </a:ln>
+          </p:spPr>
+          <p:style>
+            <a:lnRef idx="1">
+              <a:schemeClr val="accent1"/>
+            </a:lnRef>
+            <a:fillRef idx="0">
+              <a:schemeClr val="accent1"/>
+            </a:fillRef>
+            <a:effectRef idx="0">
+              <a:schemeClr val="accent1"/>
+            </a:effectRef>
+            <a:fontRef idx="minor">
+              <a:schemeClr val="tx1"/>
+            </a:fontRef>
+          </p:style>
+        </p:cxnSp>
+        <p:cxnSp>
+          <p:nvCxnSpPr>
+            <p:cNvPr id="3" name="Straight Connector 2">
+              <a:extLst>
+                <a:ext uri="{FF2B5EF4-FFF2-40B4-BE49-F238E27FC236}">
+                  <a16:creationId xmlns:a16="http://schemas.microsoft.com/office/drawing/2014/main" id="{A77A0DFC-592F-6835-0397-367F3439DEA7}"/>
+                </a:ext>
+              </a:extLst>
+            </p:cNvPr>
+            <p:cNvCxnSpPr>
+              <a:cxnSpLocks/>
+            </p:cNvCxnSpPr>
+            <p:nvPr/>
+          </p:nvCxnSpPr>
+          <p:spPr>
+            <a:xfrm>
+              <a:off x="10894974" y="5393064"/>
+              <a:ext cx="0" cy="399013"/>
+            </a:xfrm>
+            <a:prstGeom prst="line">
+              <a:avLst/>
+            </a:prstGeom>
+            <a:ln w="50800">
+              <a:solidFill>
+                <a:schemeClr val="tx1"/>
+              </a:solidFill>
+            </a:ln>
+          </p:spPr>
+          <p:style>
+            <a:lnRef idx="1">
+              <a:schemeClr val="accent1"/>
+            </a:lnRef>
+            <a:fillRef idx="0">
+              <a:schemeClr val="accent1"/>
+            </a:fillRef>
+            <a:effectRef idx="0">
+              <a:schemeClr val="accent1"/>
+            </a:effectRef>
+            <a:fontRef idx="minor">
+              <a:schemeClr val="tx1"/>
+            </a:fontRef>
+          </p:style>
+        </p:cxnSp>
+        <p:cxnSp>
+          <p:nvCxnSpPr>
+            <p:cNvPr id="22" name="Straight Connector 21">
+              <a:extLst>
+                <a:ext uri="{FF2B5EF4-FFF2-40B4-BE49-F238E27FC236}">
+                  <a16:creationId xmlns:a16="http://schemas.microsoft.com/office/drawing/2014/main" id="{CD2B96CE-20F8-39F4-8699-329AE382B3CB}"/>
+                </a:ext>
+              </a:extLst>
+            </p:cNvPr>
+            <p:cNvCxnSpPr>
+              <a:cxnSpLocks/>
+            </p:cNvCxnSpPr>
+            <p:nvPr/>
+          </p:nvCxnSpPr>
+          <p:spPr>
+            <a:xfrm>
+              <a:off x="8752180" y="5593021"/>
+              <a:ext cx="2117631" cy="0"/>
+            </a:xfrm>
+            <a:prstGeom prst="line">
+              <a:avLst/>
+            </a:prstGeom>
+            <a:ln w="38100">
+              <a:solidFill>
+                <a:schemeClr val="tx1"/>
+              </a:solidFill>
+              <a:tailEnd type="none"/>
+            </a:ln>
+          </p:spPr>
+          <p:style>
+            <a:lnRef idx="1">
+              <a:schemeClr val="accent1"/>
+            </a:lnRef>
+            <a:fillRef idx="0">
+              <a:schemeClr val="accent1"/>
+            </a:fillRef>
+            <a:effectRef idx="0">
+              <a:schemeClr val="accent1"/>
+            </a:effectRef>
+            <a:fontRef idx="minor">
+              <a:schemeClr val="tx1"/>
+            </a:fontRef>
+          </p:style>
+        </p:cxnSp>
+        <p:sp>
+          <p:nvSpPr>
+            <p:cNvPr id="23" name="TextBox 22">
+              <a:extLst>
+                <a:ext uri="{FF2B5EF4-FFF2-40B4-BE49-F238E27FC236}">
+                  <a16:creationId xmlns:a16="http://schemas.microsoft.com/office/drawing/2014/main" id="{5EE79FA7-8BC9-3FC0-72C1-005C9805F13B}"/>
+                </a:ext>
+              </a:extLst>
+            </p:cNvPr>
+            <p:cNvSpPr txBox="1"/>
+            <p:nvPr/>
+          </p:nvSpPr>
+          <p:spPr>
+            <a:xfrm>
+              <a:off x="9491899" y="5732024"/>
+              <a:ext cx="652743" cy="369332"/>
+            </a:xfrm>
+            <a:prstGeom prst="rect">
+              <a:avLst/>
+            </a:prstGeom>
+            <a:noFill/>
+          </p:spPr>
+          <p:txBody>
+            <a:bodyPr wrap="none" rtlCol="0">
+              <a:spAutoFit/>
+            </a:bodyPr>
+            <a:lstStyle/>
+            <a:p>
+              <a:pPr marL="0" marR="0" lvl="0" indent="0" algn="l" defTabSz="914400" rtl="0" eaLnBrk="1" fontAlgn="auto" latinLnBrk="0" hangingPunct="1">
+                <a:lnSpc>
+                  <a:spcPct val="100000"/>
+                </a:lnSpc>
+                <a:spcBef>
+                  <a:spcPts val="0"/>
+                </a:spcBef>
+                <a:spcAft>
+                  <a:spcPts val="0"/>
+                </a:spcAft>
+                <a:buClrTx/>
+                <a:buSzTx/>
+                <a:buFontTx/>
+                <a:buNone/>
+                <a:tabLst/>
+                <a:defRPr/>
+              </a:pPr>
+              <a:r>
+                <a:rPr kumimoji="0" lang="en-US" sz="1800" b="0" i="0" u="none" strike="noStrike" kern="1200" cap="none" spc="0" normalizeH="0" baseline="0" noProof="0" dirty="0">
+                  <a:ln>
+                    <a:noFill/>
+                  </a:ln>
+                  <a:solidFill>
+                    <a:prstClr val="black"/>
+                  </a:solidFill>
+                  <a:effectLst/>
+                  <a:uLnTx/>
+                  <a:uFillTx/>
+                  <a:latin typeface="Calibri" panose="020F0502020204030204"/>
+                  <a:ea typeface="+mn-ea"/>
+                  <a:cs typeface="+mn-cs"/>
+                </a:rPr>
+                <a:t>2031</a:t>
+              </a:r>
+            </a:p>
+          </p:txBody>
+        </p:sp>
+        <p:cxnSp>
+          <p:nvCxnSpPr>
+            <p:cNvPr id="47" name="Straight Connector 46">
+              <a:extLst>
+                <a:ext uri="{FF2B5EF4-FFF2-40B4-BE49-F238E27FC236}">
+                  <a16:creationId xmlns:a16="http://schemas.microsoft.com/office/drawing/2014/main" id="{35712366-CBBD-774D-D29D-F76BC92077BB}"/>
+                </a:ext>
+              </a:extLst>
+            </p:cNvPr>
+            <p:cNvCxnSpPr>
+              <a:cxnSpLocks/>
+            </p:cNvCxnSpPr>
+            <p:nvPr/>
+          </p:nvCxnSpPr>
+          <p:spPr>
+            <a:xfrm>
+              <a:off x="329175" y="5593021"/>
+              <a:ext cx="2117631" cy="0"/>
+            </a:xfrm>
+            <a:prstGeom prst="line">
+              <a:avLst/>
+            </a:prstGeom>
+            <a:ln w="38100">
+              <a:solidFill>
+                <a:schemeClr val="tx1"/>
+              </a:solidFill>
+              <a:tailEnd type="none"/>
+            </a:ln>
+          </p:spPr>
+          <p:style>
+            <a:lnRef idx="1">
+              <a:schemeClr val="accent1"/>
+            </a:lnRef>
+            <a:fillRef idx="0">
+              <a:schemeClr val="accent1"/>
+            </a:fillRef>
+            <a:effectRef idx="0">
+              <a:schemeClr val="accent1"/>
+            </a:effectRef>
+            <a:fontRef idx="minor">
+              <a:schemeClr val="tx1"/>
+            </a:fontRef>
+          </p:style>
+        </p:cxnSp>
+        <p:sp>
+          <p:nvSpPr>
+            <p:cNvPr id="48" name="TextBox 47">
+              <a:extLst>
+                <a:ext uri="{FF2B5EF4-FFF2-40B4-BE49-F238E27FC236}">
+                  <a16:creationId xmlns:a16="http://schemas.microsoft.com/office/drawing/2014/main" id="{E917B52F-8798-E5B9-F716-764497D85717}"/>
+                </a:ext>
+              </a:extLst>
+            </p:cNvPr>
+            <p:cNvSpPr txBox="1"/>
+            <p:nvPr/>
+          </p:nvSpPr>
+          <p:spPr>
+            <a:xfrm>
+              <a:off x="1068894" y="5732024"/>
+              <a:ext cx="652744" cy="369332"/>
+            </a:xfrm>
+            <a:prstGeom prst="rect">
+              <a:avLst/>
+            </a:prstGeom>
+            <a:noFill/>
+          </p:spPr>
+          <p:txBody>
+            <a:bodyPr wrap="none" rtlCol="0">
+              <a:spAutoFit/>
+            </a:bodyPr>
+            <a:lstStyle/>
+            <a:p>
+              <a:pPr marL="0" marR="0" lvl="0" indent="0" algn="l" defTabSz="914400" rtl="0" eaLnBrk="1" fontAlgn="auto" latinLnBrk="0" hangingPunct="1">
+                <a:lnSpc>
+                  <a:spcPct val="100000"/>
+                </a:lnSpc>
+                <a:spcBef>
+                  <a:spcPts val="0"/>
+                </a:spcBef>
+                <a:spcAft>
+                  <a:spcPts val="0"/>
+                </a:spcAft>
+                <a:buClrTx/>
+                <a:buSzTx/>
+                <a:buFontTx/>
+                <a:buNone/>
+                <a:tabLst/>
+                <a:defRPr/>
+              </a:pPr>
+              <a:r>
+                <a:rPr kumimoji="0" lang="en-US" sz="1800" b="0" i="0" u="none" strike="noStrike" kern="1200" cap="none" spc="0" normalizeH="0" baseline="0" noProof="0" dirty="0">
+                  <a:ln>
+                    <a:noFill/>
+                  </a:ln>
+                  <a:solidFill>
+                    <a:prstClr val="black"/>
+                  </a:solidFill>
+                  <a:effectLst/>
+                  <a:uLnTx/>
+                  <a:uFillTx/>
+                  <a:latin typeface="Calibri" panose="020F0502020204030204"/>
+                  <a:ea typeface="+mn-ea"/>
+                  <a:cs typeface="+mn-cs"/>
+                </a:rPr>
+                <a:t>2027</a:t>
+              </a:r>
+            </a:p>
+          </p:txBody>
+        </p:sp>
+        <p:cxnSp>
+          <p:nvCxnSpPr>
+            <p:cNvPr id="51" name="Straight Connector 50">
+              <a:extLst>
+                <a:ext uri="{FF2B5EF4-FFF2-40B4-BE49-F238E27FC236}">
+                  <a16:creationId xmlns:a16="http://schemas.microsoft.com/office/drawing/2014/main" id="{3BAA40F7-FA37-F8E6-734F-9EFCD8C224D2}"/>
+                </a:ext>
+              </a:extLst>
+            </p:cNvPr>
+            <p:cNvCxnSpPr>
+              <a:cxnSpLocks/>
+            </p:cNvCxnSpPr>
+            <p:nvPr/>
+          </p:nvCxnSpPr>
+          <p:spPr>
+            <a:xfrm>
+              <a:off x="6646428" y="5593021"/>
+              <a:ext cx="2117631" cy="0"/>
+            </a:xfrm>
+            <a:prstGeom prst="line">
+              <a:avLst/>
+            </a:prstGeom>
+            <a:ln w="38100">
+              <a:solidFill>
+                <a:schemeClr val="tx1"/>
+              </a:solidFill>
+              <a:tailEnd type="none"/>
+            </a:ln>
+          </p:spPr>
+          <p:style>
+            <a:lnRef idx="1">
+              <a:schemeClr val="accent1"/>
+            </a:lnRef>
+            <a:fillRef idx="0">
+              <a:schemeClr val="accent1"/>
+            </a:fillRef>
+            <a:effectRef idx="0">
+              <a:schemeClr val="accent1"/>
+            </a:effectRef>
+            <a:fontRef idx="minor">
+              <a:schemeClr val="tx1"/>
+            </a:fontRef>
+          </p:style>
+        </p:cxnSp>
+        <p:sp>
+          <p:nvSpPr>
+            <p:cNvPr id="52" name="TextBox 51">
+              <a:extLst>
+                <a:ext uri="{FF2B5EF4-FFF2-40B4-BE49-F238E27FC236}">
+                  <a16:creationId xmlns:a16="http://schemas.microsoft.com/office/drawing/2014/main" id="{7A6065C9-DCE7-63AE-4B6B-8458470C2441}"/>
+                </a:ext>
+              </a:extLst>
+            </p:cNvPr>
+            <p:cNvSpPr txBox="1"/>
+            <p:nvPr/>
+          </p:nvSpPr>
+          <p:spPr>
+            <a:xfrm>
+              <a:off x="7386147" y="5732024"/>
+              <a:ext cx="652743" cy="369332"/>
+            </a:xfrm>
+            <a:prstGeom prst="rect">
+              <a:avLst/>
+            </a:prstGeom>
+            <a:noFill/>
+          </p:spPr>
+          <p:txBody>
+            <a:bodyPr wrap="none" rtlCol="0">
+              <a:spAutoFit/>
+            </a:bodyPr>
+            <a:lstStyle/>
+            <a:p>
+              <a:pPr marL="0" marR="0" lvl="0" indent="0" algn="l" defTabSz="914400" rtl="0" eaLnBrk="1" fontAlgn="auto" latinLnBrk="0" hangingPunct="1">
+                <a:lnSpc>
+                  <a:spcPct val="100000"/>
+                </a:lnSpc>
+                <a:spcBef>
+                  <a:spcPts val="0"/>
+                </a:spcBef>
+                <a:spcAft>
+                  <a:spcPts val="0"/>
+                </a:spcAft>
+                <a:buClrTx/>
+                <a:buSzTx/>
+                <a:buFontTx/>
+                <a:buNone/>
+                <a:tabLst/>
+                <a:defRPr/>
+              </a:pPr>
+              <a:r>
+                <a:rPr kumimoji="0" lang="en-US" sz="1800" b="0" i="0" u="none" strike="noStrike" kern="1200" cap="none" spc="0" normalizeH="0" baseline="0" noProof="0" dirty="0">
+                  <a:ln>
+                    <a:noFill/>
+                  </a:ln>
+                  <a:solidFill>
+                    <a:prstClr val="black"/>
+                  </a:solidFill>
+                  <a:effectLst/>
+                  <a:uLnTx/>
+                  <a:uFillTx/>
+                  <a:latin typeface="Calibri" panose="020F0502020204030204"/>
+                  <a:ea typeface="+mn-ea"/>
+                  <a:cs typeface="+mn-cs"/>
+                </a:rPr>
+                <a:t>2030</a:t>
+              </a:r>
+            </a:p>
+          </p:txBody>
+        </p:sp>
+        <p:cxnSp>
+          <p:nvCxnSpPr>
+            <p:cNvPr id="54" name="Straight Connector 53">
+              <a:extLst>
+                <a:ext uri="{FF2B5EF4-FFF2-40B4-BE49-F238E27FC236}">
+                  <a16:creationId xmlns:a16="http://schemas.microsoft.com/office/drawing/2014/main" id="{80CEA730-B2B1-C6F3-A7C9-9DE33E90676D}"/>
+                </a:ext>
+              </a:extLst>
+            </p:cNvPr>
+            <p:cNvCxnSpPr>
+              <a:cxnSpLocks/>
+            </p:cNvCxnSpPr>
+            <p:nvPr/>
+          </p:nvCxnSpPr>
+          <p:spPr>
+            <a:xfrm>
+              <a:off x="4540677" y="5593021"/>
+              <a:ext cx="2117631" cy="0"/>
+            </a:xfrm>
+            <a:prstGeom prst="line">
+              <a:avLst/>
+            </a:prstGeom>
+            <a:ln w="38100">
+              <a:solidFill>
+                <a:schemeClr val="tx1"/>
+              </a:solidFill>
+              <a:tailEnd type="none"/>
+            </a:ln>
+          </p:spPr>
+          <p:style>
+            <a:lnRef idx="1">
+              <a:schemeClr val="accent1"/>
+            </a:lnRef>
+            <a:fillRef idx="0">
+              <a:schemeClr val="accent1"/>
+            </a:fillRef>
+            <a:effectRef idx="0">
+              <a:schemeClr val="accent1"/>
+            </a:effectRef>
+            <a:fontRef idx="minor">
+              <a:schemeClr val="tx1"/>
+            </a:fontRef>
+          </p:style>
+        </p:cxnSp>
+        <p:sp>
+          <p:nvSpPr>
+            <p:cNvPr id="55" name="TextBox 54">
+              <a:extLst>
+                <a:ext uri="{FF2B5EF4-FFF2-40B4-BE49-F238E27FC236}">
+                  <a16:creationId xmlns:a16="http://schemas.microsoft.com/office/drawing/2014/main" id="{DAA7CFBE-1058-E3DA-53F8-D4F157D4F719}"/>
+                </a:ext>
+              </a:extLst>
+            </p:cNvPr>
+            <p:cNvSpPr txBox="1"/>
+            <p:nvPr/>
+          </p:nvSpPr>
+          <p:spPr>
+            <a:xfrm>
+              <a:off x="5280396" y="5732024"/>
+              <a:ext cx="652743" cy="369332"/>
+            </a:xfrm>
+            <a:prstGeom prst="rect">
+              <a:avLst/>
+            </a:prstGeom>
+            <a:noFill/>
+          </p:spPr>
+          <p:txBody>
+            <a:bodyPr wrap="none" rtlCol="0">
+              <a:spAutoFit/>
+            </a:bodyPr>
+            <a:lstStyle/>
+            <a:p>
+              <a:pPr marL="0" marR="0" lvl="0" indent="0" algn="l" defTabSz="914400" rtl="0" eaLnBrk="1" fontAlgn="auto" latinLnBrk="0" hangingPunct="1">
+                <a:lnSpc>
+                  <a:spcPct val="100000"/>
+                </a:lnSpc>
+                <a:spcBef>
+                  <a:spcPts val="0"/>
+                </a:spcBef>
+                <a:spcAft>
+                  <a:spcPts val="0"/>
+                </a:spcAft>
+                <a:buClrTx/>
+                <a:buSzTx/>
+                <a:buFontTx/>
+                <a:buNone/>
+                <a:tabLst/>
+                <a:defRPr/>
+              </a:pPr>
+              <a:r>
+                <a:rPr kumimoji="0" lang="en-US" sz="1800" b="0" i="0" u="none" strike="noStrike" kern="1200" cap="none" spc="0" normalizeH="0" baseline="0" noProof="0" dirty="0">
+                  <a:ln>
+                    <a:noFill/>
+                  </a:ln>
+                  <a:solidFill>
+                    <a:prstClr val="black"/>
+                  </a:solidFill>
+                  <a:effectLst/>
+                  <a:uLnTx/>
+                  <a:uFillTx/>
+                  <a:latin typeface="Calibri" panose="020F0502020204030204"/>
+                  <a:ea typeface="+mn-ea"/>
+                  <a:cs typeface="+mn-cs"/>
+                </a:rPr>
+                <a:t>2029</a:t>
+              </a:r>
+            </a:p>
+          </p:txBody>
+        </p:sp>
+        <p:cxnSp>
+          <p:nvCxnSpPr>
+            <p:cNvPr id="57" name="Straight Connector 56">
+              <a:extLst>
+                <a:ext uri="{FF2B5EF4-FFF2-40B4-BE49-F238E27FC236}">
+                  <a16:creationId xmlns:a16="http://schemas.microsoft.com/office/drawing/2014/main" id="{E9CB0F5D-B001-DF1F-5957-592EEC756980}"/>
+                </a:ext>
+              </a:extLst>
+            </p:cNvPr>
+            <p:cNvCxnSpPr>
+              <a:cxnSpLocks/>
+            </p:cNvCxnSpPr>
+            <p:nvPr/>
+          </p:nvCxnSpPr>
+          <p:spPr>
+            <a:xfrm>
+              <a:off x="2434926" y="5593021"/>
+              <a:ext cx="2117631" cy="0"/>
+            </a:xfrm>
+            <a:prstGeom prst="line">
+              <a:avLst/>
+            </a:prstGeom>
+            <a:ln w="38100">
+              <a:solidFill>
+                <a:schemeClr val="tx1"/>
+              </a:solidFill>
+              <a:tailEnd type="none"/>
+            </a:ln>
+          </p:spPr>
+          <p:style>
+            <a:lnRef idx="1">
+              <a:schemeClr val="accent1"/>
+            </a:lnRef>
+            <a:fillRef idx="0">
+              <a:schemeClr val="accent1"/>
+            </a:fillRef>
+            <a:effectRef idx="0">
+              <a:schemeClr val="accent1"/>
+            </a:effectRef>
+            <a:fontRef idx="minor">
+              <a:schemeClr val="tx1"/>
+            </a:fontRef>
+          </p:style>
+        </p:cxnSp>
+        <p:sp>
+          <p:nvSpPr>
+            <p:cNvPr id="58" name="TextBox 57">
+              <a:extLst>
+                <a:ext uri="{FF2B5EF4-FFF2-40B4-BE49-F238E27FC236}">
+                  <a16:creationId xmlns:a16="http://schemas.microsoft.com/office/drawing/2014/main" id="{313F5E05-B853-D5AF-2D34-CD7D9BDE4110}"/>
+                </a:ext>
+              </a:extLst>
+            </p:cNvPr>
+            <p:cNvSpPr txBox="1"/>
+            <p:nvPr/>
+          </p:nvSpPr>
+          <p:spPr>
+            <a:xfrm>
+              <a:off x="3174645" y="5732024"/>
+              <a:ext cx="652743" cy="369332"/>
+            </a:xfrm>
+            <a:prstGeom prst="rect">
+              <a:avLst/>
+            </a:prstGeom>
+            <a:noFill/>
+          </p:spPr>
+          <p:txBody>
+            <a:bodyPr wrap="none" rtlCol="0">
+              <a:spAutoFit/>
+            </a:bodyPr>
+            <a:lstStyle/>
+            <a:p>
+              <a:pPr marL="0" marR="0" lvl="0" indent="0" algn="l" defTabSz="914400" rtl="0" eaLnBrk="1" fontAlgn="auto" latinLnBrk="0" hangingPunct="1">
+                <a:lnSpc>
+                  <a:spcPct val="100000"/>
+                </a:lnSpc>
+                <a:spcBef>
+                  <a:spcPts val="0"/>
+                </a:spcBef>
+                <a:spcAft>
+                  <a:spcPts val="0"/>
+                </a:spcAft>
+                <a:buClrTx/>
+                <a:buSzTx/>
+                <a:buFontTx/>
+                <a:buNone/>
+                <a:tabLst/>
+                <a:defRPr/>
+              </a:pPr>
+              <a:r>
+                <a:rPr kumimoji="0" lang="en-US" sz="1800" b="0" i="0" u="none" strike="noStrike" kern="1200" cap="none" spc="0" normalizeH="0" baseline="0" noProof="0" dirty="0">
+                  <a:ln>
+                    <a:noFill/>
+                  </a:ln>
+                  <a:solidFill>
+                    <a:prstClr val="black"/>
+                  </a:solidFill>
+                  <a:effectLst/>
+                  <a:uLnTx/>
+                  <a:uFillTx/>
+                  <a:latin typeface="Calibri" panose="020F0502020204030204"/>
+                  <a:ea typeface="+mn-ea"/>
+                  <a:cs typeface="+mn-cs"/>
+                </a:rPr>
+                <a:t>2028</a:t>
+              </a:r>
+            </a:p>
+          </p:txBody>
+        </p:sp>
+      </p:grpSp>
+      <p:grpSp>
+        <p:nvGrpSpPr>
+          <p:cNvPr id="61" name="Group 60">
+            <a:extLst>
+              <a:ext uri="{FF2B5EF4-FFF2-40B4-BE49-F238E27FC236}">
+                <a16:creationId xmlns:a16="http://schemas.microsoft.com/office/drawing/2014/main" id="{C78AD225-52B5-DF70-01A4-8F08CE894D25}"/>
+              </a:ext>
+            </a:extLst>
+          </p:cNvPr>
+          <p:cNvGrpSpPr/>
+          <p:nvPr/>
+        </p:nvGrpSpPr>
+        <p:grpSpPr>
+          <a:xfrm>
+            <a:off x="771740" y="1394092"/>
+            <a:ext cx="2761284" cy="3514092"/>
+            <a:chOff x="771740" y="3745180"/>
+            <a:chExt cx="2761284" cy="3514092"/>
+          </a:xfrm>
+        </p:grpSpPr>
+        <p:cxnSp>
+          <p:nvCxnSpPr>
+            <p:cNvPr id="42" name="Elbow Connector 41">
+              <a:extLst>
+                <a:ext uri="{FF2B5EF4-FFF2-40B4-BE49-F238E27FC236}">
+                  <a16:creationId xmlns:a16="http://schemas.microsoft.com/office/drawing/2014/main" id="{0DCA9DAF-F231-D57B-9739-449E84014775}"/>
+                </a:ext>
+              </a:extLst>
+            </p:cNvPr>
+            <p:cNvCxnSpPr>
+              <a:cxnSpLocks/>
+              <a:stCxn id="49" idx="0"/>
+              <a:endCxn id="43" idx="1"/>
+            </p:cNvCxnSpPr>
+            <p:nvPr/>
+          </p:nvCxnSpPr>
+          <p:spPr>
+            <a:xfrm rot="5400000" flipH="1" flipV="1">
+              <a:off x="-732898" y="5480652"/>
+              <a:ext cx="3283258" cy="273981"/>
+            </a:xfrm>
+            <a:prstGeom prst="bentConnector2">
+              <a:avLst/>
+            </a:prstGeom>
+            <a:ln>
+              <a:tailEnd type="triangle"/>
+            </a:ln>
+          </p:spPr>
+          <p:style>
+            <a:lnRef idx="1">
+              <a:schemeClr val="accent1"/>
+            </a:lnRef>
+            <a:fillRef idx="0">
+              <a:schemeClr val="accent1"/>
+            </a:fillRef>
+            <a:effectRef idx="0">
+              <a:schemeClr val="accent1"/>
+            </a:effectRef>
+            <a:fontRef idx="minor">
+              <a:schemeClr val="tx1"/>
+            </a:fontRef>
+          </p:style>
+        </p:cxnSp>
+        <p:sp>
+          <p:nvSpPr>
+            <p:cNvPr id="43" name="TextBox 42">
+              <a:extLst>
+                <a:ext uri="{FF2B5EF4-FFF2-40B4-BE49-F238E27FC236}">
+                  <a16:creationId xmlns:a16="http://schemas.microsoft.com/office/drawing/2014/main" id="{07B44F4A-2AEB-9FBB-4801-069171300176}"/>
+                </a:ext>
+              </a:extLst>
+            </p:cNvPr>
+            <p:cNvSpPr txBox="1"/>
+            <p:nvPr/>
+          </p:nvSpPr>
+          <p:spPr>
+            <a:xfrm>
+              <a:off x="1045722" y="3745180"/>
+              <a:ext cx="2487302" cy="461665"/>
+            </a:xfrm>
+            <a:prstGeom prst="rect">
+              <a:avLst/>
+            </a:prstGeom>
+            <a:noFill/>
+          </p:spPr>
+          <p:txBody>
+            <a:bodyPr wrap="square" rtlCol="0">
+              <a:spAutoFit/>
+            </a:bodyPr>
+            <a:lstStyle/>
+            <a:p>
+              <a:pPr marL="0" marR="0" lvl="0" indent="0" algn="l" defTabSz="914400" rtl="0" eaLnBrk="1" fontAlgn="auto" latinLnBrk="0" hangingPunct="1">
+                <a:lnSpc>
+                  <a:spcPct val="100000"/>
+                </a:lnSpc>
+                <a:spcBef>
+                  <a:spcPts val="0"/>
+                </a:spcBef>
+                <a:spcAft>
+                  <a:spcPts val="0"/>
+                </a:spcAft>
+                <a:buClrTx/>
+                <a:buSzTx/>
+                <a:buFontTx/>
+                <a:buNone/>
+                <a:tabLst/>
+                <a:defRPr/>
+              </a:pPr>
+              <a:r>
+                <a:rPr kumimoji="0" lang="en-US" sz="1200" b="0" i="0" u="none" strike="noStrike" kern="1200" cap="none" spc="0" normalizeH="0" baseline="0" noProof="0" dirty="0">
+                  <a:ln>
+                    <a:noFill/>
+                  </a:ln>
+                  <a:solidFill>
+                    <a:srgbClr val="4472C4"/>
+                  </a:solidFill>
+                  <a:effectLst/>
+                  <a:uLnTx/>
+                  <a:uFillTx/>
+                  <a:latin typeface="Calibri" panose="020F0502020204030204"/>
+                  <a:ea typeface="+mn-ea"/>
+                  <a:cs typeface="+mn-cs"/>
+                </a:rPr>
+                <a:t>T0 + 15 Days: Encounter-based Bundle EB.1 Sent</a:t>
+              </a:r>
+            </a:p>
+          </p:txBody>
+        </p:sp>
+      </p:grpSp>
+      <p:sp>
+        <p:nvSpPr>
+          <p:cNvPr id="143" name="Diamond 142">
+            <a:extLst>
+              <a:ext uri="{FF2B5EF4-FFF2-40B4-BE49-F238E27FC236}">
+                <a16:creationId xmlns:a16="http://schemas.microsoft.com/office/drawing/2014/main" id="{E6AE7607-522C-D3B9-7FE2-9F833CD3AABA}"/>
+              </a:ext>
+            </a:extLst>
+          </p:cNvPr>
+          <p:cNvSpPr/>
+          <p:nvPr/>
+        </p:nvSpPr>
+        <p:spPr>
+          <a:xfrm>
+            <a:off x="3501016" y="4903432"/>
+            <a:ext cx="274320" cy="274320"/>
+          </a:xfrm>
+          <a:prstGeom prst="diamond">
+            <a:avLst/>
+          </a:prstGeom>
+          <a:solidFill>
+            <a:schemeClr val="accent2">
+              <a:alpha val="80000"/>
+            </a:schemeClr>
+          </a:solidFill>
+        </p:spPr>
+        <p:style>
+          <a:lnRef idx="2">
+            <a:schemeClr val="accent1">
+              <a:shade val="15000"/>
+            </a:schemeClr>
+          </a:lnRef>
+          <a:fillRef idx="1">
+            <a:schemeClr val="accent1"/>
+          </a:fillRef>
+          <a:effectRef idx="0">
+            <a:schemeClr val="accent1"/>
+          </a:effectRef>
+          <a:fontRef idx="minor">
+            <a:schemeClr val="lt1"/>
+          </a:fontRef>
+        </p:style>
+        <p:txBody>
+          <a:bodyPr rtlCol="0" anchor="ctr"/>
+          <a:lstStyle/>
+          <a:p>
+            <a:pPr marL="0" marR="0" lvl="0" indent="0" algn="ctr" defTabSz="914400" rtl="0" eaLnBrk="1" fontAlgn="auto" latinLnBrk="0" hangingPunct="1">
+              <a:lnSpc>
+                <a:spcPct val="100000"/>
+              </a:lnSpc>
+              <a:spcBef>
+                <a:spcPts val="0"/>
+              </a:spcBef>
+              <a:spcAft>
+                <a:spcPts val="0"/>
+              </a:spcAft>
+              <a:buClrTx/>
+              <a:buSzTx/>
+              <a:buFontTx/>
+              <a:buNone/>
+              <a:tabLst/>
+              <a:defRPr/>
+            </a:pPr>
+            <a:endParaRPr kumimoji="0" lang="en-US" sz="1800" b="0" i="0" u="none" strike="noStrike" kern="1200" cap="none" spc="0" normalizeH="0" baseline="0" noProof="0" dirty="0">
+              <a:ln>
+                <a:noFill/>
+              </a:ln>
+              <a:solidFill>
+                <a:prstClr val="white"/>
+              </a:solidFill>
+              <a:effectLst/>
+              <a:uLnTx/>
+              <a:uFillTx/>
+              <a:latin typeface="Calibri" panose="020F0502020204030204"/>
+              <a:ea typeface="+mn-ea"/>
+              <a:cs typeface="+mn-cs"/>
+            </a:endParaRPr>
+          </a:p>
+        </p:txBody>
+      </p:sp>
+      <p:cxnSp>
+        <p:nvCxnSpPr>
+          <p:cNvPr id="163" name="Straight Arrow Connector 162">
+            <a:extLst>
+              <a:ext uri="{FF2B5EF4-FFF2-40B4-BE49-F238E27FC236}">
+                <a16:creationId xmlns:a16="http://schemas.microsoft.com/office/drawing/2014/main" id="{921CB3F7-C7DA-741C-F63B-07912F098B61}"/>
+              </a:ext>
+            </a:extLst>
+          </p:cNvPr>
+          <p:cNvCxnSpPr>
+            <a:cxnSpLocks/>
+          </p:cNvCxnSpPr>
+          <p:nvPr/>
+        </p:nvCxnSpPr>
+        <p:spPr>
+          <a:xfrm>
+            <a:off x="693315" y="699509"/>
+            <a:ext cx="0" cy="4358663"/>
+          </a:xfrm>
+          <a:prstGeom prst="straightConnector1">
+            <a:avLst/>
+          </a:prstGeom>
+          <a:ln w="22225">
+            <a:solidFill>
+              <a:schemeClr val="tx1"/>
+            </a:solidFill>
+            <a:prstDash val="dash"/>
+            <a:headEnd type="triangle"/>
+            <a:tailEnd type="none"/>
+          </a:ln>
+        </p:spPr>
+        <p:style>
+          <a:lnRef idx="1">
+            <a:schemeClr val="accent1"/>
+          </a:lnRef>
+          <a:fillRef idx="0">
+            <a:schemeClr val="accent1"/>
+          </a:fillRef>
+          <a:effectRef idx="0">
+            <a:schemeClr val="accent1"/>
+          </a:effectRef>
+          <a:fontRef idx="minor">
+            <a:schemeClr val="tx1"/>
+          </a:fontRef>
+        </p:style>
+      </p:cxnSp>
+      <p:cxnSp>
+        <p:nvCxnSpPr>
+          <p:cNvPr id="169" name="Straight Arrow Connector 168">
+            <a:extLst>
+              <a:ext uri="{FF2B5EF4-FFF2-40B4-BE49-F238E27FC236}">
+                <a16:creationId xmlns:a16="http://schemas.microsoft.com/office/drawing/2014/main" id="{EF151F5A-0753-FFD3-01EF-100A1B743DAB}"/>
+              </a:ext>
+            </a:extLst>
+          </p:cNvPr>
+          <p:cNvCxnSpPr>
+            <a:cxnSpLocks/>
+            <a:stCxn id="94" idx="2"/>
+            <a:endCxn id="75" idx="0"/>
+          </p:cNvCxnSpPr>
+          <p:nvPr/>
+        </p:nvCxnSpPr>
+        <p:spPr>
+          <a:xfrm>
+            <a:off x="2796743" y="3365118"/>
+            <a:ext cx="8343" cy="1550883"/>
+          </a:xfrm>
+          <a:prstGeom prst="straightConnector1">
+            <a:avLst/>
+          </a:prstGeom>
+          <a:ln w="6350">
+            <a:solidFill>
+              <a:schemeClr val="accent6"/>
+            </a:solidFill>
+            <a:prstDash val="solid"/>
+            <a:headEnd type="triangle"/>
+            <a:tailEnd type="none"/>
+          </a:ln>
+        </p:spPr>
+        <p:style>
+          <a:lnRef idx="1">
+            <a:schemeClr val="accent1"/>
+          </a:lnRef>
+          <a:fillRef idx="0">
+            <a:schemeClr val="accent1"/>
+          </a:fillRef>
+          <a:effectRef idx="0">
+            <a:schemeClr val="accent1"/>
+          </a:effectRef>
+          <a:fontRef idx="minor">
+            <a:schemeClr val="tx1"/>
+          </a:fontRef>
+        </p:style>
+      </p:cxnSp>
+      <p:sp>
+        <p:nvSpPr>
+          <p:cNvPr id="64" name="TextBox 63">
+            <a:extLst>
+              <a:ext uri="{FF2B5EF4-FFF2-40B4-BE49-F238E27FC236}">
+                <a16:creationId xmlns:a16="http://schemas.microsoft.com/office/drawing/2014/main" id="{70A3F70F-2B1B-C4CB-43C6-46C14DBC4ED3}"/>
+              </a:ext>
+            </a:extLst>
+          </p:cNvPr>
+          <p:cNvSpPr txBox="1"/>
+          <p:nvPr/>
+        </p:nvSpPr>
+        <p:spPr>
+          <a:xfrm>
+            <a:off x="573934" y="372567"/>
+            <a:ext cx="3188861" cy="276999"/>
+          </a:xfrm>
+          <a:prstGeom prst="rect">
+            <a:avLst/>
+          </a:prstGeom>
+          <a:noFill/>
+        </p:spPr>
+        <p:txBody>
+          <a:bodyPr wrap="square" rtlCol="0">
+            <a:spAutoFit/>
+          </a:bodyPr>
+          <a:lstStyle/>
+          <a:p>
+            <a:pPr marL="0" marR="0" lvl="0" indent="0" algn="l" defTabSz="914400" rtl="0" eaLnBrk="1" fontAlgn="auto" latinLnBrk="0" hangingPunct="1">
+              <a:lnSpc>
+                <a:spcPct val="100000"/>
+              </a:lnSpc>
+              <a:spcBef>
+                <a:spcPts val="0"/>
+              </a:spcBef>
+              <a:spcAft>
+                <a:spcPts val="0"/>
+              </a:spcAft>
+              <a:buClrTx/>
+              <a:buSzTx/>
+              <a:buFontTx/>
+              <a:buNone/>
+              <a:tabLst/>
+              <a:defRPr/>
+            </a:pPr>
+            <a:r>
+              <a:rPr kumimoji="0" lang="en-US" sz="1200" b="0" i="0" u="none" strike="noStrike" kern="1200" cap="none" spc="0" normalizeH="0" baseline="0" noProof="0" dirty="0">
+                <a:ln>
+                  <a:noFill/>
+                </a:ln>
+                <a:solidFill>
+                  <a:prstClr val="black"/>
+                </a:solidFill>
+                <a:effectLst/>
+                <a:uLnTx/>
+                <a:uFillTx/>
+                <a:latin typeface="Calibri" panose="020F0502020204030204"/>
+                <a:ea typeface="+mn-ea"/>
+                <a:cs typeface="+mn-cs"/>
+              </a:rPr>
+              <a:t>T0: Encounter with Primary Tumor Diagnosis </a:t>
+            </a:r>
+          </a:p>
+        </p:txBody>
+      </p:sp>
+      <p:cxnSp>
+        <p:nvCxnSpPr>
+          <p:cNvPr id="88" name="Straight Arrow Connector 87">
+            <a:extLst>
+              <a:ext uri="{FF2B5EF4-FFF2-40B4-BE49-F238E27FC236}">
+                <a16:creationId xmlns:a16="http://schemas.microsoft.com/office/drawing/2014/main" id="{BF6854C8-4E9E-19E1-A111-C7C4504217E5}"/>
+              </a:ext>
+            </a:extLst>
+          </p:cNvPr>
+          <p:cNvCxnSpPr>
+            <a:cxnSpLocks/>
+            <a:stCxn id="98" idx="2"/>
+          </p:cNvCxnSpPr>
+          <p:nvPr/>
+        </p:nvCxnSpPr>
+        <p:spPr>
+          <a:xfrm>
+            <a:off x="9143379" y="1313600"/>
+            <a:ext cx="0" cy="3740941"/>
+          </a:xfrm>
+          <a:prstGeom prst="straightConnector1">
+            <a:avLst/>
+          </a:prstGeom>
+          <a:ln w="22225">
+            <a:solidFill>
+              <a:schemeClr val="tx1"/>
+            </a:solidFill>
+            <a:prstDash val="dash"/>
+            <a:headEnd type="triangle"/>
+            <a:tailEnd type="none"/>
+          </a:ln>
+        </p:spPr>
+        <p:style>
+          <a:lnRef idx="1">
+            <a:schemeClr val="accent1"/>
+          </a:lnRef>
+          <a:fillRef idx="0">
+            <a:schemeClr val="accent1"/>
+          </a:fillRef>
+          <a:effectRef idx="0">
+            <a:schemeClr val="accent1"/>
+          </a:effectRef>
+          <a:fontRef idx="minor">
+            <a:schemeClr val="tx1"/>
+          </a:fontRef>
+        </p:style>
+      </p:cxnSp>
+      <p:sp>
+        <p:nvSpPr>
+          <p:cNvPr id="49" name="Diamond 48">
+            <a:extLst>
+              <a:ext uri="{FF2B5EF4-FFF2-40B4-BE49-F238E27FC236}">
+                <a16:creationId xmlns:a16="http://schemas.microsoft.com/office/drawing/2014/main" id="{FC98C28B-EA96-7B1F-D34C-0ECFD76B3192}"/>
+              </a:ext>
+            </a:extLst>
+          </p:cNvPr>
+          <p:cNvSpPr/>
+          <p:nvPr/>
+        </p:nvSpPr>
+        <p:spPr>
+          <a:xfrm>
+            <a:off x="634581" y="4908183"/>
+            <a:ext cx="274320" cy="274320"/>
+          </a:xfrm>
+          <a:prstGeom prst="diamond">
+            <a:avLst/>
+          </a:prstGeom>
+          <a:solidFill>
+            <a:schemeClr val="accent1">
+              <a:alpha val="50000"/>
+            </a:schemeClr>
+          </a:solidFill>
+        </p:spPr>
+        <p:style>
+          <a:lnRef idx="2">
+            <a:schemeClr val="accent1">
+              <a:shade val="15000"/>
+            </a:schemeClr>
+          </a:lnRef>
+          <a:fillRef idx="1">
+            <a:schemeClr val="accent1"/>
+          </a:fillRef>
+          <a:effectRef idx="0">
+            <a:schemeClr val="accent1"/>
+          </a:effectRef>
+          <a:fontRef idx="minor">
+            <a:schemeClr val="lt1"/>
+          </a:fontRef>
+        </p:style>
+        <p:txBody>
+          <a:bodyPr rtlCol="0" anchor="ctr"/>
+          <a:lstStyle/>
+          <a:p>
+            <a:pPr marL="0" marR="0" lvl="0" indent="0" algn="ctr" defTabSz="914400" rtl="0" eaLnBrk="1" fontAlgn="auto" latinLnBrk="0" hangingPunct="1">
+              <a:lnSpc>
+                <a:spcPct val="100000"/>
+              </a:lnSpc>
+              <a:spcBef>
+                <a:spcPts val="0"/>
+              </a:spcBef>
+              <a:spcAft>
+                <a:spcPts val="0"/>
+              </a:spcAft>
+              <a:buClrTx/>
+              <a:buSzTx/>
+              <a:buFontTx/>
+              <a:buNone/>
+              <a:tabLst/>
+              <a:defRPr/>
+            </a:pPr>
+            <a:endParaRPr kumimoji="0" lang="en-US" sz="1800" b="0" i="0" u="none" strike="noStrike" kern="1200" cap="none" spc="0" normalizeH="0" baseline="0" noProof="0">
+              <a:ln>
+                <a:noFill/>
+              </a:ln>
+              <a:solidFill>
+                <a:prstClr val="white"/>
+              </a:solidFill>
+              <a:effectLst/>
+              <a:uLnTx/>
+              <a:uFillTx/>
+              <a:latin typeface="Calibri" panose="020F0502020204030204"/>
+              <a:ea typeface="+mn-ea"/>
+              <a:cs typeface="+mn-cs"/>
+            </a:endParaRPr>
+          </a:p>
+        </p:txBody>
+      </p:sp>
+      <p:sp>
+        <p:nvSpPr>
+          <p:cNvPr id="75" name="Diamond 74">
+            <a:extLst>
+              <a:ext uri="{FF2B5EF4-FFF2-40B4-BE49-F238E27FC236}">
+                <a16:creationId xmlns:a16="http://schemas.microsoft.com/office/drawing/2014/main" id="{034FA73C-F766-5570-A78F-14AA0020CAC7}"/>
+              </a:ext>
+            </a:extLst>
+          </p:cNvPr>
+          <p:cNvSpPr/>
+          <p:nvPr/>
+        </p:nvSpPr>
+        <p:spPr>
+          <a:xfrm>
+            <a:off x="2667926" y="4916001"/>
+            <a:ext cx="274320" cy="274320"/>
+          </a:xfrm>
+          <a:prstGeom prst="diamond">
+            <a:avLst/>
+          </a:prstGeom>
+          <a:solidFill>
+            <a:schemeClr val="accent6">
+              <a:alpha val="50000"/>
+            </a:schemeClr>
+          </a:solidFill>
+        </p:spPr>
+        <p:style>
+          <a:lnRef idx="2">
+            <a:schemeClr val="accent1">
+              <a:shade val="15000"/>
+            </a:schemeClr>
+          </a:lnRef>
+          <a:fillRef idx="1">
+            <a:schemeClr val="accent1"/>
+          </a:fillRef>
+          <a:effectRef idx="0">
+            <a:schemeClr val="accent1"/>
+          </a:effectRef>
+          <a:fontRef idx="minor">
+            <a:schemeClr val="lt1"/>
+          </a:fontRef>
+        </p:style>
+        <p:txBody>
+          <a:bodyPr rtlCol="0" anchor="ctr"/>
+          <a:lstStyle/>
+          <a:p>
+            <a:pPr marL="0" marR="0" lvl="0" indent="0" algn="ctr" defTabSz="914400" rtl="0" eaLnBrk="1" fontAlgn="auto" latinLnBrk="0" hangingPunct="1">
+              <a:lnSpc>
+                <a:spcPct val="100000"/>
+              </a:lnSpc>
+              <a:spcBef>
+                <a:spcPts val="0"/>
+              </a:spcBef>
+              <a:spcAft>
+                <a:spcPts val="0"/>
+              </a:spcAft>
+              <a:buClrTx/>
+              <a:buSzTx/>
+              <a:buFontTx/>
+              <a:buNone/>
+              <a:tabLst/>
+              <a:defRPr/>
+            </a:pPr>
+            <a:endParaRPr kumimoji="0" lang="en-US" sz="1800" b="0" i="0" u="none" strike="noStrike" kern="1200" cap="none" spc="0" normalizeH="0" baseline="0" noProof="0" dirty="0">
+              <a:ln>
+                <a:noFill/>
+              </a:ln>
+              <a:solidFill>
+                <a:prstClr val="white"/>
+              </a:solidFill>
+              <a:effectLst/>
+              <a:uLnTx/>
+              <a:uFillTx/>
+              <a:latin typeface="Calibri" panose="020F0502020204030204"/>
+              <a:ea typeface="+mn-ea"/>
+              <a:cs typeface="+mn-cs"/>
+            </a:endParaRPr>
+          </a:p>
+        </p:txBody>
+      </p:sp>
+      <p:sp>
+        <p:nvSpPr>
+          <p:cNvPr id="30" name="Oval 29">
+            <a:extLst>
+              <a:ext uri="{FF2B5EF4-FFF2-40B4-BE49-F238E27FC236}">
+                <a16:creationId xmlns:a16="http://schemas.microsoft.com/office/drawing/2014/main" id="{B3846CA2-FF50-2DC8-CF67-64794AD85D8A}"/>
+              </a:ext>
+            </a:extLst>
+          </p:cNvPr>
+          <p:cNvSpPr/>
+          <p:nvPr/>
+        </p:nvSpPr>
+        <p:spPr>
+          <a:xfrm>
+            <a:off x="549241" y="4908144"/>
+            <a:ext cx="274320" cy="274320"/>
+          </a:xfrm>
+          <a:prstGeom prst="ellipse">
+            <a:avLst/>
+          </a:prstGeom>
+          <a:solidFill>
+            <a:srgbClr val="FF0000">
+              <a:alpha val="50000"/>
+            </a:srgbClr>
+          </a:solidFill>
+        </p:spPr>
+        <p:style>
+          <a:lnRef idx="2">
+            <a:schemeClr val="accent1">
+              <a:shade val="15000"/>
+            </a:schemeClr>
+          </a:lnRef>
+          <a:fillRef idx="1">
+            <a:schemeClr val="accent1"/>
+          </a:fillRef>
+          <a:effectRef idx="0">
+            <a:schemeClr val="accent1"/>
+          </a:effectRef>
+          <a:fontRef idx="minor">
+            <a:schemeClr val="lt1"/>
+          </a:fontRef>
+        </p:style>
+        <p:txBody>
+          <a:bodyPr rtlCol="0" anchor="ctr"/>
+          <a:lstStyle/>
+          <a:p>
+            <a:pPr marL="0" marR="0" lvl="0" indent="0" algn="ctr" defTabSz="914400" rtl="0" eaLnBrk="1" fontAlgn="auto" latinLnBrk="0" hangingPunct="1">
+              <a:lnSpc>
+                <a:spcPct val="100000"/>
+              </a:lnSpc>
+              <a:spcBef>
+                <a:spcPts val="0"/>
+              </a:spcBef>
+              <a:spcAft>
+                <a:spcPts val="0"/>
+              </a:spcAft>
+              <a:buClrTx/>
+              <a:buSzTx/>
+              <a:buFontTx/>
+              <a:buNone/>
+              <a:tabLst/>
+              <a:defRPr/>
+            </a:pPr>
+            <a:endParaRPr kumimoji="0" lang="en-US" sz="1800" b="0" i="0" u="none" strike="noStrike" kern="1200" cap="none" spc="0" normalizeH="0" baseline="0" noProof="0">
+              <a:ln>
+                <a:noFill/>
+              </a:ln>
+              <a:solidFill>
+                <a:prstClr val="white"/>
+              </a:solidFill>
+              <a:effectLst/>
+              <a:uLnTx/>
+              <a:uFillTx/>
+              <a:latin typeface="Calibri" panose="020F0502020204030204"/>
+              <a:ea typeface="+mn-ea"/>
+              <a:cs typeface="+mn-cs"/>
+            </a:endParaRPr>
+          </a:p>
+        </p:txBody>
+      </p:sp>
+      <p:sp>
+        <p:nvSpPr>
+          <p:cNvPr id="94" name="TextBox 93">
+            <a:extLst>
+              <a:ext uri="{FF2B5EF4-FFF2-40B4-BE49-F238E27FC236}">
+                <a16:creationId xmlns:a16="http://schemas.microsoft.com/office/drawing/2014/main" id="{3B4CD533-E0B6-1B5C-1FF5-821A1FA1A58E}"/>
+              </a:ext>
+            </a:extLst>
+          </p:cNvPr>
+          <p:cNvSpPr txBox="1"/>
+          <p:nvPr/>
+        </p:nvSpPr>
+        <p:spPr>
+          <a:xfrm>
+            <a:off x="1798220" y="2903453"/>
+            <a:ext cx="1997046" cy="461665"/>
+          </a:xfrm>
+          <a:prstGeom prst="rect">
+            <a:avLst/>
+          </a:prstGeom>
+          <a:noFill/>
+        </p:spPr>
+        <p:txBody>
+          <a:bodyPr wrap="square" rtlCol="0">
+            <a:spAutoFit/>
+          </a:bodyPr>
+          <a:lstStyle/>
+          <a:p>
+            <a:pPr marL="0" marR="0" lvl="0" indent="0" algn="l" defTabSz="914400" rtl="0" eaLnBrk="1" fontAlgn="auto" latinLnBrk="0" hangingPunct="1">
+              <a:lnSpc>
+                <a:spcPct val="100000"/>
+              </a:lnSpc>
+              <a:spcBef>
+                <a:spcPts val="0"/>
+              </a:spcBef>
+              <a:spcAft>
+                <a:spcPts val="0"/>
+              </a:spcAft>
+              <a:buClrTx/>
+              <a:buSzTx/>
+              <a:buFontTx/>
+              <a:buNone/>
+              <a:tabLst/>
+              <a:defRPr/>
+            </a:pPr>
+            <a:r>
+              <a:rPr kumimoji="0" lang="en-US" sz="1200" b="0" i="0" u="none" strike="noStrike" kern="1200" cap="none" spc="0" normalizeH="0" baseline="0" noProof="0" dirty="0">
+                <a:ln>
+                  <a:noFill/>
+                </a:ln>
+                <a:solidFill>
+                  <a:srgbClr val="70AD47"/>
+                </a:solidFill>
+                <a:effectLst/>
+                <a:uLnTx/>
+                <a:uFillTx/>
+                <a:latin typeface="Calibri" panose="020F0502020204030204"/>
+                <a:ea typeface="+mn-ea"/>
+                <a:cs typeface="+mn-cs"/>
+              </a:rPr>
+              <a:t>T0 + 12 Months: Time-based </a:t>
+            </a:r>
+          </a:p>
+          <a:p>
+            <a:pPr marL="0" marR="0" lvl="0" indent="0" algn="l" defTabSz="914400" rtl="0" eaLnBrk="1" fontAlgn="auto" latinLnBrk="0" hangingPunct="1">
+              <a:lnSpc>
+                <a:spcPct val="100000"/>
+              </a:lnSpc>
+              <a:spcBef>
+                <a:spcPts val="0"/>
+              </a:spcBef>
+              <a:spcAft>
+                <a:spcPts val="0"/>
+              </a:spcAft>
+              <a:buClrTx/>
+              <a:buSzTx/>
+              <a:buFontTx/>
+              <a:buNone/>
+              <a:tabLst/>
+              <a:defRPr/>
+            </a:pPr>
+            <a:r>
+              <a:rPr kumimoji="0" lang="en-US" sz="1200" b="0" i="0" u="none" strike="noStrike" kern="1200" cap="none" spc="0" normalizeH="0" baseline="0" noProof="0" dirty="0">
+                <a:ln>
+                  <a:noFill/>
+                </a:ln>
+                <a:solidFill>
+                  <a:srgbClr val="70AD47"/>
+                </a:solidFill>
+                <a:effectLst/>
+                <a:uLnTx/>
+                <a:uFillTx/>
+                <a:latin typeface="Calibri" panose="020F0502020204030204"/>
+                <a:ea typeface="+mn-ea"/>
+                <a:cs typeface="+mn-cs"/>
+              </a:rPr>
+              <a:t>Bundle TB.1 Sent</a:t>
+            </a:r>
+          </a:p>
+        </p:txBody>
+      </p:sp>
+      <p:sp>
+        <p:nvSpPr>
+          <p:cNvPr id="95" name="TextBox 94">
+            <a:extLst>
+              <a:ext uri="{FF2B5EF4-FFF2-40B4-BE49-F238E27FC236}">
+                <a16:creationId xmlns:a16="http://schemas.microsoft.com/office/drawing/2014/main" id="{46B8EF42-89AD-D4A2-5EB8-3CE5695C606F}"/>
+              </a:ext>
+            </a:extLst>
+          </p:cNvPr>
+          <p:cNvSpPr txBox="1"/>
+          <p:nvPr/>
+        </p:nvSpPr>
+        <p:spPr>
+          <a:xfrm>
+            <a:off x="3932048" y="2910518"/>
+            <a:ext cx="1961052" cy="461665"/>
+          </a:xfrm>
+          <a:prstGeom prst="rect">
+            <a:avLst/>
+          </a:prstGeom>
+          <a:noFill/>
+        </p:spPr>
+        <p:txBody>
+          <a:bodyPr wrap="square" rtlCol="0">
+            <a:spAutoFit/>
+          </a:bodyPr>
+          <a:lstStyle/>
+          <a:p>
+            <a:pPr marL="0" marR="0" lvl="0" indent="0" algn="l" defTabSz="914400" rtl="0" eaLnBrk="1" fontAlgn="auto" latinLnBrk="0" hangingPunct="1">
+              <a:lnSpc>
+                <a:spcPct val="100000"/>
+              </a:lnSpc>
+              <a:spcBef>
+                <a:spcPts val="0"/>
+              </a:spcBef>
+              <a:spcAft>
+                <a:spcPts val="0"/>
+              </a:spcAft>
+              <a:buClrTx/>
+              <a:buSzTx/>
+              <a:buFontTx/>
+              <a:buNone/>
+              <a:tabLst/>
+              <a:defRPr/>
+            </a:pPr>
+            <a:r>
+              <a:rPr kumimoji="0" lang="en-US" sz="1200" b="0" i="0" u="none" strike="noStrike" kern="1200" cap="none" spc="0" normalizeH="0" baseline="0" noProof="0" dirty="0">
+                <a:ln>
+                  <a:noFill/>
+                </a:ln>
+                <a:solidFill>
+                  <a:srgbClr val="70AD47"/>
+                </a:solidFill>
+                <a:effectLst/>
+                <a:uLnTx/>
+                <a:uFillTx/>
+                <a:latin typeface="Calibri" panose="020F0502020204030204"/>
+                <a:ea typeface="+mn-ea"/>
+                <a:cs typeface="+mn-cs"/>
+              </a:rPr>
+              <a:t>T0 + 24 Months: Time-based </a:t>
+            </a:r>
+          </a:p>
+          <a:p>
+            <a:pPr marL="0" marR="0" lvl="0" indent="0" algn="l" defTabSz="914400" rtl="0" eaLnBrk="1" fontAlgn="auto" latinLnBrk="0" hangingPunct="1">
+              <a:lnSpc>
+                <a:spcPct val="100000"/>
+              </a:lnSpc>
+              <a:spcBef>
+                <a:spcPts val="0"/>
+              </a:spcBef>
+              <a:spcAft>
+                <a:spcPts val="0"/>
+              </a:spcAft>
+              <a:buClrTx/>
+              <a:buSzTx/>
+              <a:buFontTx/>
+              <a:buNone/>
+              <a:tabLst/>
+              <a:defRPr/>
+            </a:pPr>
+            <a:r>
+              <a:rPr kumimoji="0" lang="en-US" sz="1200" b="0" i="0" u="none" strike="noStrike" kern="1200" cap="none" spc="0" normalizeH="0" baseline="0" noProof="0" dirty="0">
+                <a:ln>
+                  <a:noFill/>
+                </a:ln>
+                <a:solidFill>
+                  <a:srgbClr val="70AD47"/>
+                </a:solidFill>
+                <a:effectLst/>
+                <a:uLnTx/>
+                <a:uFillTx/>
+                <a:latin typeface="Calibri" panose="020F0502020204030204"/>
+                <a:ea typeface="+mn-ea"/>
+                <a:cs typeface="+mn-cs"/>
+              </a:rPr>
+              <a:t>Bundle TB.2 Sent</a:t>
+            </a:r>
+          </a:p>
+        </p:txBody>
+      </p:sp>
+      <p:sp>
+        <p:nvSpPr>
+          <p:cNvPr id="97" name="TextBox 96">
+            <a:extLst>
+              <a:ext uri="{FF2B5EF4-FFF2-40B4-BE49-F238E27FC236}">
+                <a16:creationId xmlns:a16="http://schemas.microsoft.com/office/drawing/2014/main" id="{ACCE47F3-C66A-6D1F-0AFB-EDEC3D624326}"/>
+              </a:ext>
+            </a:extLst>
+          </p:cNvPr>
+          <p:cNvSpPr txBox="1"/>
+          <p:nvPr/>
+        </p:nvSpPr>
+        <p:spPr>
+          <a:xfrm>
+            <a:off x="6045200" y="2915781"/>
+            <a:ext cx="1990054" cy="461665"/>
+          </a:xfrm>
+          <a:prstGeom prst="rect">
+            <a:avLst/>
+          </a:prstGeom>
+          <a:noFill/>
+        </p:spPr>
+        <p:txBody>
+          <a:bodyPr wrap="square" rtlCol="0">
+            <a:spAutoFit/>
+          </a:bodyPr>
+          <a:lstStyle/>
+          <a:p>
+            <a:pPr marL="0" marR="0" lvl="0" indent="0" algn="l" defTabSz="914400" rtl="0" eaLnBrk="1" fontAlgn="auto" latinLnBrk="0" hangingPunct="1">
+              <a:lnSpc>
+                <a:spcPct val="100000"/>
+              </a:lnSpc>
+              <a:spcBef>
+                <a:spcPts val="0"/>
+              </a:spcBef>
+              <a:spcAft>
+                <a:spcPts val="0"/>
+              </a:spcAft>
+              <a:buClrTx/>
+              <a:buSzTx/>
+              <a:buFontTx/>
+              <a:buNone/>
+              <a:tabLst/>
+              <a:defRPr/>
+            </a:pPr>
+            <a:r>
+              <a:rPr kumimoji="0" lang="en-US" sz="1200" b="0" i="0" u="none" strike="noStrike" kern="1200" cap="none" spc="0" normalizeH="0" baseline="0" noProof="0" dirty="0">
+                <a:ln>
+                  <a:noFill/>
+                </a:ln>
+                <a:solidFill>
+                  <a:srgbClr val="70AD47"/>
+                </a:solidFill>
+                <a:effectLst/>
+                <a:uLnTx/>
+                <a:uFillTx/>
+                <a:latin typeface="Calibri" panose="020F0502020204030204"/>
+                <a:ea typeface="+mn-ea"/>
+                <a:cs typeface="+mn-cs"/>
+              </a:rPr>
+              <a:t>T0 + 36 Months: Time-based </a:t>
+            </a:r>
+          </a:p>
+          <a:p>
+            <a:pPr marL="0" marR="0" lvl="0" indent="0" algn="l" defTabSz="914400" rtl="0" eaLnBrk="1" fontAlgn="auto" latinLnBrk="0" hangingPunct="1">
+              <a:lnSpc>
+                <a:spcPct val="100000"/>
+              </a:lnSpc>
+              <a:spcBef>
+                <a:spcPts val="0"/>
+              </a:spcBef>
+              <a:spcAft>
+                <a:spcPts val="0"/>
+              </a:spcAft>
+              <a:buClrTx/>
+              <a:buSzTx/>
+              <a:buFontTx/>
+              <a:buNone/>
+              <a:tabLst/>
+              <a:defRPr/>
+            </a:pPr>
+            <a:r>
+              <a:rPr kumimoji="0" lang="en-US" sz="1200" b="0" i="0" u="none" strike="noStrike" kern="1200" cap="none" spc="0" normalizeH="0" baseline="0" noProof="0" dirty="0">
+                <a:ln>
+                  <a:noFill/>
+                </a:ln>
+                <a:solidFill>
+                  <a:srgbClr val="70AD47"/>
+                </a:solidFill>
+                <a:effectLst/>
+                <a:uLnTx/>
+                <a:uFillTx/>
+                <a:latin typeface="Calibri" panose="020F0502020204030204"/>
+                <a:ea typeface="+mn-ea"/>
+                <a:cs typeface="+mn-cs"/>
+              </a:rPr>
+              <a:t>Bundle TB.3 Sent</a:t>
+            </a:r>
+          </a:p>
+        </p:txBody>
+      </p:sp>
+      <p:sp>
+        <p:nvSpPr>
+          <p:cNvPr id="98" name="TextBox 97">
+            <a:extLst>
+              <a:ext uri="{FF2B5EF4-FFF2-40B4-BE49-F238E27FC236}">
+                <a16:creationId xmlns:a16="http://schemas.microsoft.com/office/drawing/2014/main" id="{31FB30E6-D064-6D3B-E75A-6E627B6B95E8}"/>
+              </a:ext>
+            </a:extLst>
+          </p:cNvPr>
+          <p:cNvSpPr txBox="1"/>
+          <p:nvPr/>
+        </p:nvSpPr>
+        <p:spPr>
+          <a:xfrm>
+            <a:off x="8542922" y="851935"/>
+            <a:ext cx="1200913" cy="461665"/>
+          </a:xfrm>
+          <a:prstGeom prst="rect">
+            <a:avLst/>
+          </a:prstGeom>
+          <a:noFill/>
+        </p:spPr>
+        <p:txBody>
+          <a:bodyPr wrap="square" rtlCol="0">
+            <a:spAutoFit/>
+          </a:bodyPr>
+          <a:lstStyle/>
+          <a:p>
+            <a:pPr marL="0" marR="0" lvl="0" indent="0" algn="l" defTabSz="914400" rtl="0" eaLnBrk="1" fontAlgn="auto" latinLnBrk="0" hangingPunct="1">
+              <a:lnSpc>
+                <a:spcPct val="100000"/>
+              </a:lnSpc>
+              <a:spcBef>
+                <a:spcPts val="0"/>
+              </a:spcBef>
+              <a:spcAft>
+                <a:spcPts val="0"/>
+              </a:spcAft>
+              <a:buClrTx/>
+              <a:buSzTx/>
+              <a:buFontTx/>
+              <a:buNone/>
+              <a:tabLst/>
+              <a:defRPr/>
+            </a:pPr>
+            <a:r>
+              <a:rPr kumimoji="0" lang="en-US" sz="1200" b="0" i="0" u="none" strike="noStrike" kern="1200" cap="none" spc="0" normalizeH="0" baseline="0" noProof="0" dirty="0">
+                <a:ln>
+                  <a:noFill/>
+                </a:ln>
+                <a:solidFill>
+                  <a:prstClr val="black"/>
+                </a:solidFill>
+                <a:effectLst/>
+                <a:uLnTx/>
+                <a:uFillTx/>
+                <a:latin typeface="Calibri" panose="020F0502020204030204"/>
+                <a:ea typeface="+mn-ea"/>
+                <a:cs typeface="+mn-cs"/>
+              </a:rPr>
+              <a:t>T0 + 48 Months: </a:t>
+            </a:r>
+          </a:p>
+          <a:p>
+            <a:pPr marL="0" marR="0" lvl="0" indent="0" algn="l" defTabSz="914400" rtl="0" eaLnBrk="1" fontAlgn="auto" latinLnBrk="0" hangingPunct="1">
+              <a:lnSpc>
+                <a:spcPct val="100000"/>
+              </a:lnSpc>
+              <a:spcBef>
+                <a:spcPts val="0"/>
+              </a:spcBef>
+              <a:spcAft>
+                <a:spcPts val="0"/>
+              </a:spcAft>
+              <a:buClrTx/>
+              <a:buSzTx/>
+              <a:buFontTx/>
+              <a:buNone/>
+              <a:tabLst/>
+              <a:defRPr/>
+            </a:pPr>
+            <a:r>
+              <a:rPr kumimoji="0" lang="en-US" sz="1200" b="0" i="0" u="none" strike="noStrike" kern="1200" cap="none" spc="0" normalizeH="0" baseline="0" noProof="0" dirty="0">
+                <a:ln>
+                  <a:noFill/>
+                </a:ln>
+                <a:solidFill>
+                  <a:prstClr val="black"/>
+                </a:solidFill>
+                <a:effectLst/>
+                <a:uLnTx/>
+                <a:uFillTx/>
+                <a:latin typeface="Calibri" panose="020F0502020204030204"/>
+                <a:ea typeface="+mn-ea"/>
+                <a:cs typeface="+mn-cs"/>
+              </a:rPr>
+              <a:t>No  Bundle Sent </a:t>
+            </a:r>
+          </a:p>
+        </p:txBody>
+      </p:sp>
+      <p:sp>
+        <p:nvSpPr>
+          <p:cNvPr id="106" name="Diamond 105">
+            <a:extLst>
+              <a:ext uri="{FF2B5EF4-FFF2-40B4-BE49-F238E27FC236}">
+                <a16:creationId xmlns:a16="http://schemas.microsoft.com/office/drawing/2014/main" id="{4DE663A1-5774-6053-8F42-A4C39BEC9859}"/>
+              </a:ext>
+            </a:extLst>
+          </p:cNvPr>
+          <p:cNvSpPr/>
+          <p:nvPr/>
+        </p:nvSpPr>
+        <p:spPr>
+          <a:xfrm>
+            <a:off x="4781394" y="4908144"/>
+            <a:ext cx="274320" cy="274320"/>
+          </a:xfrm>
+          <a:prstGeom prst="diamond">
+            <a:avLst/>
+          </a:prstGeom>
+          <a:solidFill>
+            <a:schemeClr val="accent6">
+              <a:alpha val="50000"/>
+            </a:schemeClr>
+          </a:solidFill>
+        </p:spPr>
+        <p:style>
+          <a:lnRef idx="2">
+            <a:schemeClr val="accent1">
+              <a:shade val="15000"/>
+            </a:schemeClr>
+          </a:lnRef>
+          <a:fillRef idx="1">
+            <a:schemeClr val="accent1"/>
+          </a:fillRef>
+          <a:effectRef idx="0">
+            <a:schemeClr val="accent1"/>
+          </a:effectRef>
+          <a:fontRef idx="minor">
+            <a:schemeClr val="lt1"/>
+          </a:fontRef>
+        </p:style>
+        <p:txBody>
+          <a:bodyPr rtlCol="0" anchor="ctr"/>
+          <a:lstStyle/>
+          <a:p>
+            <a:pPr marL="0" marR="0" lvl="0" indent="0" algn="ctr" defTabSz="914400" rtl="0" eaLnBrk="1" fontAlgn="auto" latinLnBrk="0" hangingPunct="1">
+              <a:lnSpc>
+                <a:spcPct val="100000"/>
+              </a:lnSpc>
+              <a:spcBef>
+                <a:spcPts val="0"/>
+              </a:spcBef>
+              <a:spcAft>
+                <a:spcPts val="0"/>
+              </a:spcAft>
+              <a:buClrTx/>
+              <a:buSzTx/>
+              <a:buFontTx/>
+              <a:buNone/>
+              <a:tabLst/>
+              <a:defRPr/>
+            </a:pPr>
+            <a:endParaRPr kumimoji="0" lang="en-US" sz="1800" b="0" i="0" u="none" strike="noStrike" kern="1200" cap="none" spc="0" normalizeH="0" baseline="0" noProof="0" dirty="0">
+              <a:ln>
+                <a:noFill/>
+              </a:ln>
+              <a:solidFill>
+                <a:prstClr val="white"/>
+              </a:solidFill>
+              <a:effectLst/>
+              <a:uLnTx/>
+              <a:uFillTx/>
+              <a:latin typeface="Calibri" panose="020F0502020204030204"/>
+              <a:ea typeface="+mn-ea"/>
+              <a:cs typeface="+mn-cs"/>
+            </a:endParaRPr>
+          </a:p>
+        </p:txBody>
+      </p:sp>
+      <p:sp>
+        <p:nvSpPr>
+          <p:cNvPr id="107" name="Diamond 106">
+            <a:extLst>
+              <a:ext uri="{FF2B5EF4-FFF2-40B4-BE49-F238E27FC236}">
+                <a16:creationId xmlns:a16="http://schemas.microsoft.com/office/drawing/2014/main" id="{A3AB8934-9544-753F-3268-269A3437432F}"/>
+              </a:ext>
+            </a:extLst>
+          </p:cNvPr>
+          <p:cNvSpPr/>
+          <p:nvPr/>
+        </p:nvSpPr>
+        <p:spPr>
+          <a:xfrm>
+            <a:off x="6883331" y="4908144"/>
+            <a:ext cx="274320" cy="274320"/>
+          </a:xfrm>
+          <a:prstGeom prst="diamond">
+            <a:avLst/>
+          </a:prstGeom>
+          <a:solidFill>
+            <a:schemeClr val="accent6">
+              <a:alpha val="50000"/>
+            </a:schemeClr>
+          </a:solidFill>
+        </p:spPr>
+        <p:style>
+          <a:lnRef idx="2">
+            <a:schemeClr val="accent1">
+              <a:shade val="15000"/>
+            </a:schemeClr>
+          </a:lnRef>
+          <a:fillRef idx="1">
+            <a:schemeClr val="accent1"/>
+          </a:fillRef>
+          <a:effectRef idx="0">
+            <a:schemeClr val="accent1"/>
+          </a:effectRef>
+          <a:fontRef idx="minor">
+            <a:schemeClr val="lt1"/>
+          </a:fontRef>
+        </p:style>
+        <p:txBody>
+          <a:bodyPr rtlCol="0" anchor="ctr"/>
+          <a:lstStyle/>
+          <a:p>
+            <a:pPr marL="0" marR="0" lvl="0" indent="0" algn="ctr" defTabSz="914400" rtl="0" eaLnBrk="1" fontAlgn="auto" latinLnBrk="0" hangingPunct="1">
+              <a:lnSpc>
+                <a:spcPct val="100000"/>
+              </a:lnSpc>
+              <a:spcBef>
+                <a:spcPts val="0"/>
+              </a:spcBef>
+              <a:spcAft>
+                <a:spcPts val="0"/>
+              </a:spcAft>
+              <a:buClrTx/>
+              <a:buSzTx/>
+              <a:buFontTx/>
+              <a:buNone/>
+              <a:tabLst/>
+              <a:defRPr/>
+            </a:pPr>
+            <a:endParaRPr kumimoji="0" lang="en-US" sz="1800" b="0" i="0" u="none" strike="noStrike" kern="1200" cap="none" spc="0" normalizeH="0" baseline="0" noProof="0" dirty="0">
+              <a:ln>
+                <a:noFill/>
+              </a:ln>
+              <a:solidFill>
+                <a:prstClr val="white"/>
+              </a:solidFill>
+              <a:effectLst/>
+              <a:uLnTx/>
+              <a:uFillTx/>
+              <a:latin typeface="Calibri" panose="020F0502020204030204"/>
+              <a:ea typeface="+mn-ea"/>
+              <a:cs typeface="+mn-cs"/>
+            </a:endParaRPr>
+          </a:p>
+        </p:txBody>
+      </p:sp>
+      <p:grpSp>
+        <p:nvGrpSpPr>
+          <p:cNvPr id="108" name="Group 107">
+            <a:extLst>
+              <a:ext uri="{FF2B5EF4-FFF2-40B4-BE49-F238E27FC236}">
+                <a16:creationId xmlns:a16="http://schemas.microsoft.com/office/drawing/2014/main" id="{4D035505-32B5-4B0B-4CAC-4869C8B564DC}"/>
+              </a:ext>
+            </a:extLst>
+          </p:cNvPr>
+          <p:cNvGrpSpPr/>
+          <p:nvPr/>
+        </p:nvGrpSpPr>
+        <p:grpSpPr>
+          <a:xfrm>
+            <a:off x="1482940" y="2032985"/>
+            <a:ext cx="2771642" cy="2875199"/>
+            <a:chOff x="761382" y="3521660"/>
+            <a:chExt cx="2771642" cy="2875199"/>
+          </a:xfrm>
+        </p:grpSpPr>
+        <p:cxnSp>
+          <p:nvCxnSpPr>
+            <p:cNvPr id="109" name="Elbow Connector 108">
+              <a:extLst>
+                <a:ext uri="{FF2B5EF4-FFF2-40B4-BE49-F238E27FC236}">
+                  <a16:creationId xmlns:a16="http://schemas.microsoft.com/office/drawing/2014/main" id="{8570CA14-96CD-B14E-BCD7-FBF4F7490AD5}"/>
+                </a:ext>
+              </a:extLst>
+            </p:cNvPr>
+            <p:cNvCxnSpPr>
+              <a:cxnSpLocks/>
+              <a:stCxn id="111" idx="0"/>
+              <a:endCxn id="110" idx="1"/>
+            </p:cNvCxnSpPr>
+            <p:nvPr/>
+          </p:nvCxnSpPr>
+          <p:spPr>
+            <a:xfrm rot="5400000" flipH="1" flipV="1">
+              <a:off x="-464797" y="4886340"/>
+              <a:ext cx="2736698" cy="284339"/>
+            </a:xfrm>
+            <a:prstGeom prst="bentConnector2">
+              <a:avLst/>
+            </a:prstGeom>
+            <a:ln>
+              <a:tailEnd type="triangle"/>
+            </a:ln>
+          </p:spPr>
+          <p:style>
+            <a:lnRef idx="1">
+              <a:schemeClr val="accent1"/>
+            </a:lnRef>
+            <a:fillRef idx="0">
+              <a:schemeClr val="accent1"/>
+            </a:fillRef>
+            <a:effectRef idx="0">
+              <a:schemeClr val="accent1"/>
+            </a:effectRef>
+            <a:fontRef idx="minor">
+              <a:schemeClr val="tx1"/>
+            </a:fontRef>
+          </p:style>
+        </p:cxnSp>
+        <p:sp>
+          <p:nvSpPr>
+            <p:cNvPr id="110" name="TextBox 109">
+              <a:extLst>
+                <a:ext uri="{FF2B5EF4-FFF2-40B4-BE49-F238E27FC236}">
+                  <a16:creationId xmlns:a16="http://schemas.microsoft.com/office/drawing/2014/main" id="{CE1C15BE-DB4B-51F0-50A0-6FB63A329AA3}"/>
+                </a:ext>
+              </a:extLst>
+            </p:cNvPr>
+            <p:cNvSpPr txBox="1"/>
+            <p:nvPr/>
+          </p:nvSpPr>
+          <p:spPr>
+            <a:xfrm>
+              <a:off x="1045722" y="3521660"/>
+              <a:ext cx="2487302" cy="276999"/>
+            </a:xfrm>
+            <a:prstGeom prst="rect">
+              <a:avLst/>
+            </a:prstGeom>
+            <a:noFill/>
+          </p:spPr>
+          <p:txBody>
+            <a:bodyPr wrap="square" rtlCol="0">
+              <a:spAutoFit/>
+            </a:bodyPr>
+            <a:lstStyle/>
+            <a:p>
+              <a:pPr marL="0" marR="0" lvl="0" indent="0" algn="l" defTabSz="914400" rtl="0" eaLnBrk="1" fontAlgn="auto" latinLnBrk="0" hangingPunct="1">
+                <a:lnSpc>
+                  <a:spcPct val="100000"/>
+                </a:lnSpc>
+                <a:spcBef>
+                  <a:spcPts val="0"/>
+                </a:spcBef>
+                <a:spcAft>
+                  <a:spcPts val="0"/>
+                </a:spcAft>
+                <a:buClrTx/>
+                <a:buSzTx/>
+                <a:buFontTx/>
+                <a:buNone/>
+                <a:tabLst/>
+                <a:defRPr/>
+              </a:pPr>
+              <a:r>
+                <a:rPr kumimoji="0" lang="en-US" sz="1200" b="0" i="0" u="none" strike="noStrike" kern="1200" cap="none" spc="0" normalizeH="0" baseline="0" noProof="0" dirty="0">
+                  <a:ln>
+                    <a:noFill/>
+                  </a:ln>
+                  <a:solidFill>
+                    <a:srgbClr val="4472C4"/>
+                  </a:solidFill>
+                  <a:effectLst/>
+                  <a:uLnTx/>
+                  <a:uFillTx/>
+                  <a:latin typeface="Calibri" panose="020F0502020204030204"/>
+                  <a:ea typeface="+mn-ea"/>
+                  <a:cs typeface="+mn-cs"/>
+                </a:rPr>
+                <a:t>Encounter-based Bundle EB.2 Sent</a:t>
+              </a:r>
+            </a:p>
+          </p:txBody>
+        </p:sp>
+      </p:grpSp>
+      <p:sp>
+        <p:nvSpPr>
+          <p:cNvPr id="111" name="Diamond 110">
+            <a:extLst>
+              <a:ext uri="{FF2B5EF4-FFF2-40B4-BE49-F238E27FC236}">
+                <a16:creationId xmlns:a16="http://schemas.microsoft.com/office/drawing/2014/main" id="{85691A53-C354-CBF2-0255-C6145A2FBF2E}"/>
+              </a:ext>
+            </a:extLst>
+          </p:cNvPr>
+          <p:cNvSpPr/>
+          <p:nvPr/>
+        </p:nvSpPr>
+        <p:spPr>
+          <a:xfrm>
+            <a:off x="1345781" y="4908183"/>
+            <a:ext cx="274320" cy="274320"/>
+          </a:xfrm>
+          <a:prstGeom prst="diamond">
+            <a:avLst/>
+          </a:prstGeom>
+          <a:solidFill>
+            <a:schemeClr val="accent1">
+              <a:alpha val="50000"/>
+            </a:schemeClr>
+          </a:solidFill>
+        </p:spPr>
+        <p:style>
+          <a:lnRef idx="2">
+            <a:schemeClr val="accent1">
+              <a:shade val="15000"/>
+            </a:schemeClr>
+          </a:lnRef>
+          <a:fillRef idx="1">
+            <a:schemeClr val="accent1"/>
+          </a:fillRef>
+          <a:effectRef idx="0">
+            <a:schemeClr val="accent1"/>
+          </a:effectRef>
+          <a:fontRef idx="minor">
+            <a:schemeClr val="lt1"/>
+          </a:fontRef>
+        </p:style>
+        <p:txBody>
+          <a:bodyPr rtlCol="0" anchor="ctr"/>
+          <a:lstStyle/>
+          <a:p>
+            <a:pPr marL="0" marR="0" lvl="0" indent="0" algn="ctr" defTabSz="914400" rtl="0" eaLnBrk="1" fontAlgn="auto" latinLnBrk="0" hangingPunct="1">
+              <a:lnSpc>
+                <a:spcPct val="100000"/>
+              </a:lnSpc>
+              <a:spcBef>
+                <a:spcPts val="0"/>
+              </a:spcBef>
+              <a:spcAft>
+                <a:spcPts val="0"/>
+              </a:spcAft>
+              <a:buClrTx/>
+              <a:buSzTx/>
+              <a:buFontTx/>
+              <a:buNone/>
+              <a:tabLst/>
+              <a:defRPr/>
+            </a:pPr>
+            <a:endParaRPr kumimoji="0" lang="en-US" sz="1800" b="0" i="0" u="none" strike="noStrike" kern="1200" cap="none" spc="0" normalizeH="0" baseline="0" noProof="0">
+              <a:ln>
+                <a:noFill/>
+              </a:ln>
+              <a:solidFill>
+                <a:prstClr val="white"/>
+              </a:solidFill>
+              <a:effectLst/>
+              <a:uLnTx/>
+              <a:uFillTx/>
+              <a:latin typeface="Calibri" panose="020F0502020204030204"/>
+              <a:ea typeface="+mn-ea"/>
+              <a:cs typeface="+mn-cs"/>
+            </a:endParaRPr>
+          </a:p>
+        </p:txBody>
+      </p:sp>
+      <p:grpSp>
+        <p:nvGrpSpPr>
+          <p:cNvPr id="12" name="Group 11">
+            <a:extLst>
+              <a:ext uri="{FF2B5EF4-FFF2-40B4-BE49-F238E27FC236}">
+                <a16:creationId xmlns:a16="http://schemas.microsoft.com/office/drawing/2014/main" id="{26179008-02FC-29DC-C0CD-0FA380C0EC25}"/>
+              </a:ext>
+            </a:extLst>
+          </p:cNvPr>
+          <p:cNvGrpSpPr/>
+          <p:nvPr/>
+        </p:nvGrpSpPr>
+        <p:grpSpPr>
+          <a:xfrm>
+            <a:off x="5988901" y="2047648"/>
+            <a:ext cx="2898443" cy="3145015"/>
+            <a:chOff x="5734901" y="2586128"/>
+            <a:chExt cx="2898443" cy="3145015"/>
+          </a:xfrm>
+        </p:grpSpPr>
+        <p:cxnSp>
+          <p:nvCxnSpPr>
+            <p:cNvPr id="114" name="Elbow Connector 113">
+              <a:extLst>
+                <a:ext uri="{FF2B5EF4-FFF2-40B4-BE49-F238E27FC236}">
+                  <a16:creationId xmlns:a16="http://schemas.microsoft.com/office/drawing/2014/main" id="{A4E76EA4-CA14-1764-D11C-07408AEA3C08}"/>
+                </a:ext>
+              </a:extLst>
+            </p:cNvPr>
+            <p:cNvCxnSpPr>
+              <a:cxnSpLocks/>
+              <a:stCxn id="116" idx="0"/>
+              <a:endCxn id="115" idx="1"/>
+            </p:cNvCxnSpPr>
+            <p:nvPr/>
+          </p:nvCxnSpPr>
+          <p:spPr>
+            <a:xfrm rot="5400000" flipH="1" flipV="1">
+              <a:off x="4642955" y="3953736"/>
+              <a:ext cx="2732195" cy="273981"/>
+            </a:xfrm>
+            <a:prstGeom prst="bentConnector2">
+              <a:avLst/>
+            </a:prstGeom>
+            <a:ln>
+              <a:tailEnd type="triangle"/>
+            </a:ln>
+          </p:spPr>
+          <p:style>
+            <a:lnRef idx="1">
+              <a:schemeClr val="accent1"/>
+            </a:lnRef>
+            <a:fillRef idx="0">
+              <a:schemeClr val="accent1"/>
+            </a:fillRef>
+            <a:effectRef idx="0">
+              <a:schemeClr val="accent1"/>
+            </a:effectRef>
+            <a:fontRef idx="minor">
+              <a:schemeClr val="tx1"/>
+            </a:fontRef>
+          </p:style>
+        </p:cxnSp>
+        <p:sp>
+          <p:nvSpPr>
+            <p:cNvPr id="115" name="TextBox 114">
+              <a:extLst>
+                <a:ext uri="{FF2B5EF4-FFF2-40B4-BE49-F238E27FC236}">
+                  <a16:creationId xmlns:a16="http://schemas.microsoft.com/office/drawing/2014/main" id="{31B8649A-5BD0-5ED8-9127-962118097116}"/>
+                </a:ext>
+              </a:extLst>
+            </p:cNvPr>
+            <p:cNvSpPr txBox="1"/>
+            <p:nvPr/>
+          </p:nvSpPr>
+          <p:spPr>
+            <a:xfrm>
+              <a:off x="6146042" y="2586128"/>
+              <a:ext cx="2487302" cy="276999"/>
+            </a:xfrm>
+            <a:prstGeom prst="rect">
+              <a:avLst/>
+            </a:prstGeom>
+            <a:noFill/>
+          </p:spPr>
+          <p:txBody>
+            <a:bodyPr wrap="square" rtlCol="0">
+              <a:spAutoFit/>
+            </a:bodyPr>
+            <a:lstStyle/>
+            <a:p>
+              <a:pPr marL="0" marR="0" lvl="0" indent="0" algn="l" defTabSz="914400" rtl="0" eaLnBrk="1" fontAlgn="auto" latinLnBrk="0" hangingPunct="1">
+                <a:lnSpc>
+                  <a:spcPct val="100000"/>
+                </a:lnSpc>
+                <a:spcBef>
+                  <a:spcPts val="0"/>
+                </a:spcBef>
+                <a:spcAft>
+                  <a:spcPts val="0"/>
+                </a:spcAft>
+                <a:buClrTx/>
+                <a:buSzTx/>
+                <a:buFontTx/>
+                <a:buNone/>
+                <a:tabLst/>
+                <a:defRPr/>
+              </a:pPr>
+              <a:r>
+                <a:rPr kumimoji="0" lang="en-US" sz="1200" b="0" i="0" u="none" strike="noStrike" kern="1200" cap="none" spc="0" normalizeH="0" baseline="0" noProof="0" dirty="0">
+                  <a:ln>
+                    <a:noFill/>
+                  </a:ln>
+                  <a:solidFill>
+                    <a:srgbClr val="4472C4"/>
+                  </a:solidFill>
+                  <a:effectLst/>
+                  <a:uLnTx/>
+                  <a:uFillTx/>
+                  <a:latin typeface="Calibri" panose="020F0502020204030204"/>
+                  <a:ea typeface="+mn-ea"/>
+                  <a:cs typeface="+mn-cs"/>
+                </a:rPr>
+                <a:t>Encounter-based Bundle EB.3 Sent</a:t>
+              </a:r>
+            </a:p>
+          </p:txBody>
+        </p:sp>
+        <p:sp>
+          <p:nvSpPr>
+            <p:cNvPr id="116" name="Diamond 115">
+              <a:extLst>
+                <a:ext uri="{FF2B5EF4-FFF2-40B4-BE49-F238E27FC236}">
+                  <a16:creationId xmlns:a16="http://schemas.microsoft.com/office/drawing/2014/main" id="{1F0C639B-6E8C-5C63-0647-E9207B8FEEA5}"/>
+                </a:ext>
+              </a:extLst>
+            </p:cNvPr>
+            <p:cNvSpPr/>
+            <p:nvPr/>
+          </p:nvSpPr>
+          <p:spPr>
+            <a:xfrm>
+              <a:off x="5734901" y="5456823"/>
+              <a:ext cx="274320" cy="274320"/>
+            </a:xfrm>
+            <a:prstGeom prst="diamond">
+              <a:avLst/>
+            </a:prstGeom>
+            <a:solidFill>
+              <a:schemeClr val="accent1">
+                <a:alpha val="50000"/>
+              </a:schemeClr>
+            </a:solidFill>
+          </p:spPr>
+          <p:style>
+            <a:lnRef idx="2">
+              <a:schemeClr val="accent1">
+                <a:shade val="15000"/>
+              </a:schemeClr>
+            </a:lnRef>
+            <a:fillRef idx="1">
+              <a:schemeClr val="accent1"/>
+            </a:fillRef>
+            <a:effectRef idx="0">
+              <a:schemeClr val="accent1"/>
+            </a:effectRef>
+            <a:fontRef idx="minor">
+              <a:schemeClr val="lt1"/>
+            </a:fontRef>
+          </p:style>
+          <p:txBody>
+            <a:bodyPr rtlCol="0" anchor="ctr"/>
+            <a:lstStyle/>
+            <a:p>
+              <a:pPr marL="0" marR="0" lvl="0" indent="0" algn="ctr" defTabSz="914400" rtl="0" eaLnBrk="1" fontAlgn="auto" latinLnBrk="0" hangingPunct="1">
+                <a:lnSpc>
+                  <a:spcPct val="100000"/>
+                </a:lnSpc>
+                <a:spcBef>
+                  <a:spcPts val="0"/>
+                </a:spcBef>
+                <a:spcAft>
+                  <a:spcPts val="0"/>
+                </a:spcAft>
+                <a:buClrTx/>
+                <a:buSzTx/>
+                <a:buFontTx/>
+                <a:buNone/>
+                <a:tabLst/>
+                <a:defRPr/>
+              </a:pPr>
+              <a:endParaRPr kumimoji="0" lang="en-US" sz="1800" b="0" i="0" u="none" strike="noStrike" kern="1200" cap="none" spc="0" normalizeH="0" baseline="0" noProof="0">
+                <a:ln>
+                  <a:noFill/>
+                </a:ln>
+                <a:solidFill>
+                  <a:prstClr val="white"/>
+                </a:solidFill>
+                <a:effectLst/>
+                <a:uLnTx/>
+                <a:uFillTx/>
+                <a:latin typeface="Calibri" panose="020F0502020204030204"/>
+                <a:ea typeface="+mn-ea"/>
+                <a:cs typeface="+mn-cs"/>
+              </a:endParaRPr>
+            </a:p>
+          </p:txBody>
+        </p:sp>
+      </p:grpSp>
+      <p:grpSp>
+        <p:nvGrpSpPr>
+          <p:cNvPr id="118" name="Group 117">
+            <a:extLst>
+              <a:ext uri="{FF2B5EF4-FFF2-40B4-BE49-F238E27FC236}">
+                <a16:creationId xmlns:a16="http://schemas.microsoft.com/office/drawing/2014/main" id="{97A4C61D-11E4-57E0-C4CA-BDFB86772CE4}"/>
+              </a:ext>
+            </a:extLst>
+          </p:cNvPr>
+          <p:cNvGrpSpPr/>
+          <p:nvPr/>
+        </p:nvGrpSpPr>
+        <p:grpSpPr>
+          <a:xfrm>
+            <a:off x="3638176" y="4249221"/>
+            <a:ext cx="2732631" cy="654211"/>
+            <a:chOff x="762296" y="4995688"/>
+            <a:chExt cx="2732631" cy="2057635"/>
+          </a:xfrm>
+        </p:grpSpPr>
+        <p:cxnSp>
+          <p:nvCxnSpPr>
+            <p:cNvPr id="119" name="Elbow Connector 118">
+              <a:extLst>
+                <a:ext uri="{FF2B5EF4-FFF2-40B4-BE49-F238E27FC236}">
+                  <a16:creationId xmlns:a16="http://schemas.microsoft.com/office/drawing/2014/main" id="{DE38697B-A0F3-3556-B828-1B1AC5CF37E6}"/>
+                </a:ext>
+              </a:extLst>
+            </p:cNvPr>
+            <p:cNvCxnSpPr>
+              <a:cxnSpLocks/>
+              <a:stCxn id="143" idx="0"/>
+              <a:endCxn id="120" idx="1"/>
+            </p:cNvCxnSpPr>
+            <p:nvPr/>
+          </p:nvCxnSpPr>
+          <p:spPr>
+            <a:xfrm rot="5400000" flipH="1" flipV="1">
+              <a:off x="219155" y="6264852"/>
+              <a:ext cx="1331612" cy="245329"/>
+            </a:xfrm>
+            <a:prstGeom prst="bentConnector2">
+              <a:avLst/>
+            </a:prstGeom>
+            <a:ln>
+              <a:solidFill>
+                <a:schemeClr val="accent2"/>
+              </a:solidFill>
+              <a:tailEnd type="triangle"/>
+            </a:ln>
+          </p:spPr>
+          <p:style>
+            <a:lnRef idx="1">
+              <a:schemeClr val="accent1"/>
+            </a:lnRef>
+            <a:fillRef idx="0">
+              <a:schemeClr val="accent1"/>
+            </a:fillRef>
+            <a:effectRef idx="0">
+              <a:schemeClr val="accent1"/>
+            </a:effectRef>
+            <a:fontRef idx="minor">
+              <a:schemeClr val="tx1"/>
+            </a:fontRef>
+          </p:style>
+        </p:cxnSp>
+        <p:sp>
+          <p:nvSpPr>
+            <p:cNvPr id="120" name="TextBox 119">
+              <a:extLst>
+                <a:ext uri="{FF2B5EF4-FFF2-40B4-BE49-F238E27FC236}">
+                  <a16:creationId xmlns:a16="http://schemas.microsoft.com/office/drawing/2014/main" id="{DF823780-9358-0E55-BD62-D188B922CB86}"/>
+                </a:ext>
+              </a:extLst>
+            </p:cNvPr>
+            <p:cNvSpPr txBox="1"/>
+            <p:nvPr/>
+          </p:nvSpPr>
+          <p:spPr>
+            <a:xfrm>
+              <a:off x="1007625" y="4995688"/>
+              <a:ext cx="2487302" cy="1452039"/>
+            </a:xfrm>
+            <a:prstGeom prst="rect">
+              <a:avLst/>
+            </a:prstGeom>
+            <a:noFill/>
+          </p:spPr>
+          <p:txBody>
+            <a:bodyPr wrap="square" rtlCol="0">
+              <a:spAutoFit/>
+            </a:bodyPr>
+            <a:lstStyle/>
+            <a:p>
+              <a:pPr marL="0" marR="0" lvl="0" indent="0" algn="l" defTabSz="914400" rtl="0" eaLnBrk="1" fontAlgn="auto" latinLnBrk="0" hangingPunct="1">
+                <a:lnSpc>
+                  <a:spcPct val="100000"/>
+                </a:lnSpc>
+                <a:spcBef>
+                  <a:spcPts val="0"/>
+                </a:spcBef>
+                <a:spcAft>
+                  <a:spcPts val="0"/>
+                </a:spcAft>
+                <a:buClrTx/>
+                <a:buSzTx/>
+                <a:buFontTx/>
+                <a:buNone/>
+                <a:tabLst/>
+                <a:defRPr/>
+              </a:pPr>
+              <a:r>
+                <a:rPr kumimoji="0" lang="en-US" sz="1200" b="0" i="0" u="none" strike="noStrike" kern="1200" cap="none" spc="0" normalizeH="0" baseline="0" noProof="0" dirty="0">
+                  <a:ln>
+                    <a:noFill/>
+                  </a:ln>
+                  <a:solidFill>
+                    <a:srgbClr val="ED7D31"/>
+                  </a:solidFill>
+                  <a:effectLst/>
+                  <a:uLnTx/>
+                  <a:uFillTx/>
+                  <a:latin typeface="Calibri" panose="020F0502020204030204"/>
+                  <a:ea typeface="+mn-ea"/>
+                  <a:cs typeface="+mn-cs"/>
+                </a:rPr>
+                <a:t>Non-Encounter-based </a:t>
+              </a:r>
+            </a:p>
+            <a:p>
+              <a:pPr marL="0" marR="0" lvl="0" indent="0" algn="l" defTabSz="914400" rtl="0" eaLnBrk="1" fontAlgn="auto" latinLnBrk="0" hangingPunct="1">
+                <a:lnSpc>
+                  <a:spcPct val="100000"/>
+                </a:lnSpc>
+                <a:spcBef>
+                  <a:spcPts val="0"/>
+                </a:spcBef>
+                <a:spcAft>
+                  <a:spcPts val="0"/>
+                </a:spcAft>
+                <a:buClrTx/>
+                <a:buSzTx/>
+                <a:buFontTx/>
+                <a:buNone/>
+                <a:tabLst/>
+                <a:defRPr/>
+              </a:pPr>
+              <a:r>
+                <a:rPr kumimoji="0" lang="en-US" sz="1200" b="0" i="0" u="none" strike="noStrike" kern="1200" cap="none" spc="0" normalizeH="0" baseline="0" noProof="0" dirty="0">
+                  <a:ln>
+                    <a:noFill/>
+                  </a:ln>
+                  <a:solidFill>
+                    <a:srgbClr val="ED7D31"/>
+                  </a:solidFill>
+                  <a:effectLst/>
+                  <a:uLnTx/>
+                  <a:uFillTx/>
+                  <a:latin typeface="Calibri" panose="020F0502020204030204"/>
+                  <a:ea typeface="+mn-ea"/>
+                  <a:cs typeface="+mn-cs"/>
+                </a:rPr>
+                <a:t>Bundle NEB.1 Sent</a:t>
+              </a:r>
+            </a:p>
+          </p:txBody>
+        </p:sp>
+      </p:grpSp>
+      <p:sp>
+        <p:nvSpPr>
+          <p:cNvPr id="154" name="Diamond 153">
+            <a:extLst>
+              <a:ext uri="{FF2B5EF4-FFF2-40B4-BE49-F238E27FC236}">
+                <a16:creationId xmlns:a16="http://schemas.microsoft.com/office/drawing/2014/main" id="{5A559B5D-D21D-576C-9AD2-3CBDF19DDFB6}"/>
+              </a:ext>
+            </a:extLst>
+          </p:cNvPr>
+          <p:cNvSpPr/>
+          <p:nvPr/>
+        </p:nvSpPr>
+        <p:spPr>
+          <a:xfrm>
+            <a:off x="5339976" y="4913592"/>
+            <a:ext cx="274320" cy="274320"/>
+          </a:xfrm>
+          <a:prstGeom prst="diamond">
+            <a:avLst/>
+          </a:prstGeom>
+          <a:solidFill>
+            <a:schemeClr val="accent2">
+              <a:alpha val="80000"/>
+            </a:schemeClr>
+          </a:solidFill>
+        </p:spPr>
+        <p:style>
+          <a:lnRef idx="2">
+            <a:schemeClr val="accent1">
+              <a:shade val="15000"/>
+            </a:schemeClr>
+          </a:lnRef>
+          <a:fillRef idx="1">
+            <a:schemeClr val="accent1"/>
+          </a:fillRef>
+          <a:effectRef idx="0">
+            <a:schemeClr val="accent1"/>
+          </a:effectRef>
+          <a:fontRef idx="minor">
+            <a:schemeClr val="lt1"/>
+          </a:fontRef>
+        </p:style>
+        <p:txBody>
+          <a:bodyPr rtlCol="0" anchor="ctr"/>
+          <a:lstStyle/>
+          <a:p>
+            <a:pPr marL="0" marR="0" lvl="0" indent="0" algn="ctr" defTabSz="914400" rtl="0" eaLnBrk="1" fontAlgn="auto" latinLnBrk="0" hangingPunct="1">
+              <a:lnSpc>
+                <a:spcPct val="100000"/>
+              </a:lnSpc>
+              <a:spcBef>
+                <a:spcPts val="0"/>
+              </a:spcBef>
+              <a:spcAft>
+                <a:spcPts val="0"/>
+              </a:spcAft>
+              <a:buClrTx/>
+              <a:buSzTx/>
+              <a:buFontTx/>
+              <a:buNone/>
+              <a:tabLst/>
+              <a:defRPr/>
+            </a:pPr>
+            <a:endParaRPr kumimoji="0" lang="en-US" sz="1800" b="0" i="0" u="none" strike="noStrike" kern="1200" cap="none" spc="0" normalizeH="0" baseline="0" noProof="0" dirty="0">
+              <a:ln>
+                <a:noFill/>
+              </a:ln>
+              <a:solidFill>
+                <a:prstClr val="white"/>
+              </a:solidFill>
+              <a:effectLst/>
+              <a:uLnTx/>
+              <a:uFillTx/>
+              <a:latin typeface="Calibri" panose="020F0502020204030204"/>
+              <a:ea typeface="+mn-ea"/>
+              <a:cs typeface="+mn-cs"/>
+            </a:endParaRPr>
+          </a:p>
+        </p:txBody>
+      </p:sp>
+      <p:grpSp>
+        <p:nvGrpSpPr>
+          <p:cNvPr id="155" name="Group 154">
+            <a:extLst>
+              <a:ext uri="{FF2B5EF4-FFF2-40B4-BE49-F238E27FC236}">
+                <a16:creationId xmlns:a16="http://schemas.microsoft.com/office/drawing/2014/main" id="{4DE68963-703A-2EA1-55B4-A635F366C676}"/>
+              </a:ext>
+            </a:extLst>
+          </p:cNvPr>
+          <p:cNvGrpSpPr/>
+          <p:nvPr/>
+        </p:nvGrpSpPr>
+        <p:grpSpPr>
+          <a:xfrm>
+            <a:off x="5477135" y="4239060"/>
+            <a:ext cx="2732632" cy="674534"/>
+            <a:chOff x="762295" y="4931790"/>
+            <a:chExt cx="2732632" cy="2121556"/>
+          </a:xfrm>
+        </p:grpSpPr>
+        <p:cxnSp>
+          <p:nvCxnSpPr>
+            <p:cNvPr id="156" name="Elbow Connector 155">
+              <a:extLst>
+                <a:ext uri="{FF2B5EF4-FFF2-40B4-BE49-F238E27FC236}">
+                  <a16:creationId xmlns:a16="http://schemas.microsoft.com/office/drawing/2014/main" id="{0946036E-BE5D-49E5-4451-C778A795B9CC}"/>
+                </a:ext>
+              </a:extLst>
+            </p:cNvPr>
+            <p:cNvCxnSpPr>
+              <a:cxnSpLocks/>
+              <a:stCxn id="154" idx="0"/>
+              <a:endCxn id="157" idx="1"/>
+            </p:cNvCxnSpPr>
+            <p:nvPr/>
+          </p:nvCxnSpPr>
+          <p:spPr>
+            <a:xfrm rot="5400000" flipH="1" flipV="1">
+              <a:off x="187193" y="6232914"/>
+              <a:ext cx="1395534" cy="245329"/>
+            </a:xfrm>
+            <a:prstGeom prst="bentConnector2">
+              <a:avLst/>
+            </a:prstGeom>
+            <a:ln>
+              <a:solidFill>
+                <a:schemeClr val="accent2"/>
+              </a:solidFill>
+              <a:tailEnd type="triangle"/>
+            </a:ln>
+          </p:spPr>
+          <p:style>
+            <a:lnRef idx="1">
+              <a:schemeClr val="accent1"/>
+            </a:lnRef>
+            <a:fillRef idx="0">
+              <a:schemeClr val="accent1"/>
+            </a:fillRef>
+            <a:effectRef idx="0">
+              <a:schemeClr val="accent1"/>
+            </a:effectRef>
+            <a:fontRef idx="minor">
+              <a:schemeClr val="tx1"/>
+            </a:fontRef>
+          </p:style>
+        </p:cxnSp>
+        <p:sp>
+          <p:nvSpPr>
+            <p:cNvPr id="157" name="TextBox 156">
+              <a:extLst>
+                <a:ext uri="{FF2B5EF4-FFF2-40B4-BE49-F238E27FC236}">
+                  <a16:creationId xmlns:a16="http://schemas.microsoft.com/office/drawing/2014/main" id="{68969498-CA70-9D47-6BD3-28CB08C3B130}"/>
+                </a:ext>
+              </a:extLst>
+            </p:cNvPr>
+            <p:cNvSpPr txBox="1"/>
+            <p:nvPr/>
+          </p:nvSpPr>
+          <p:spPr>
+            <a:xfrm>
+              <a:off x="1007625" y="4931790"/>
+              <a:ext cx="2487302" cy="1452038"/>
+            </a:xfrm>
+            <a:prstGeom prst="rect">
+              <a:avLst/>
+            </a:prstGeom>
+            <a:noFill/>
+          </p:spPr>
+          <p:txBody>
+            <a:bodyPr wrap="square" rtlCol="0">
+              <a:spAutoFit/>
+            </a:bodyPr>
+            <a:lstStyle/>
+            <a:p>
+              <a:pPr marL="0" marR="0" lvl="0" indent="0" algn="l" defTabSz="914400" rtl="0" eaLnBrk="1" fontAlgn="auto" latinLnBrk="0" hangingPunct="1">
+                <a:lnSpc>
+                  <a:spcPct val="100000"/>
+                </a:lnSpc>
+                <a:spcBef>
+                  <a:spcPts val="0"/>
+                </a:spcBef>
+                <a:spcAft>
+                  <a:spcPts val="0"/>
+                </a:spcAft>
+                <a:buClrTx/>
+                <a:buSzTx/>
+                <a:buFontTx/>
+                <a:buNone/>
+                <a:tabLst/>
+                <a:defRPr/>
+              </a:pPr>
+              <a:r>
+                <a:rPr kumimoji="0" lang="en-US" sz="1200" b="0" i="0" u="none" strike="noStrike" kern="1200" cap="none" spc="0" normalizeH="0" baseline="0" noProof="0" dirty="0">
+                  <a:ln>
+                    <a:noFill/>
+                  </a:ln>
+                  <a:solidFill>
+                    <a:srgbClr val="ED7D31"/>
+                  </a:solidFill>
+                  <a:effectLst/>
+                  <a:uLnTx/>
+                  <a:uFillTx/>
+                  <a:latin typeface="Calibri" panose="020F0502020204030204"/>
+                  <a:ea typeface="+mn-ea"/>
+                  <a:cs typeface="+mn-cs"/>
+                </a:rPr>
+                <a:t>Non-Encounter-based </a:t>
+              </a:r>
+            </a:p>
+            <a:p>
+              <a:pPr marL="0" marR="0" lvl="0" indent="0" algn="l" defTabSz="914400" rtl="0" eaLnBrk="1" fontAlgn="auto" latinLnBrk="0" hangingPunct="1">
+                <a:lnSpc>
+                  <a:spcPct val="100000"/>
+                </a:lnSpc>
+                <a:spcBef>
+                  <a:spcPts val="0"/>
+                </a:spcBef>
+                <a:spcAft>
+                  <a:spcPts val="0"/>
+                </a:spcAft>
+                <a:buClrTx/>
+                <a:buSzTx/>
+                <a:buFontTx/>
+                <a:buNone/>
+                <a:tabLst/>
+                <a:defRPr/>
+              </a:pPr>
+              <a:r>
+                <a:rPr kumimoji="0" lang="en-US" sz="1200" b="0" i="0" u="none" strike="noStrike" kern="1200" cap="none" spc="0" normalizeH="0" baseline="0" noProof="0" dirty="0">
+                  <a:ln>
+                    <a:noFill/>
+                  </a:ln>
+                  <a:solidFill>
+                    <a:srgbClr val="ED7D31"/>
+                  </a:solidFill>
+                  <a:effectLst/>
+                  <a:uLnTx/>
+                  <a:uFillTx/>
+                  <a:latin typeface="Calibri" panose="020F0502020204030204"/>
+                  <a:ea typeface="+mn-ea"/>
+                  <a:cs typeface="+mn-cs"/>
+                </a:rPr>
+                <a:t>Bundle NEB.2 Sent</a:t>
+              </a:r>
+            </a:p>
+          </p:txBody>
+        </p:sp>
+      </p:grpSp>
+      <p:sp>
+        <p:nvSpPr>
+          <p:cNvPr id="162" name="TextBox 161">
+            <a:extLst>
+              <a:ext uri="{FF2B5EF4-FFF2-40B4-BE49-F238E27FC236}">
+                <a16:creationId xmlns:a16="http://schemas.microsoft.com/office/drawing/2014/main" id="{F9DB4AF3-DBD3-36F8-FA66-2A4F22DF129D}"/>
+              </a:ext>
+            </a:extLst>
+          </p:cNvPr>
+          <p:cNvSpPr txBox="1"/>
+          <p:nvPr/>
+        </p:nvSpPr>
+        <p:spPr>
+          <a:xfrm>
+            <a:off x="894075" y="834232"/>
+            <a:ext cx="3418977" cy="276999"/>
+          </a:xfrm>
+          <a:prstGeom prst="rect">
+            <a:avLst/>
+          </a:prstGeom>
+          <a:noFill/>
+        </p:spPr>
+        <p:txBody>
+          <a:bodyPr wrap="square" rtlCol="0">
+            <a:spAutoFit/>
+          </a:bodyPr>
+          <a:lstStyle/>
+          <a:p>
+            <a:pPr marL="0" marR="0" lvl="0" indent="0" algn="l" defTabSz="914400" rtl="0" eaLnBrk="1" fontAlgn="auto" latinLnBrk="0" hangingPunct="1">
+              <a:lnSpc>
+                <a:spcPct val="100000"/>
+              </a:lnSpc>
+              <a:spcBef>
+                <a:spcPts val="0"/>
+              </a:spcBef>
+              <a:spcAft>
+                <a:spcPts val="0"/>
+              </a:spcAft>
+              <a:buClrTx/>
+              <a:buSzTx/>
+              <a:buFontTx/>
+              <a:buNone/>
+              <a:tabLst/>
+              <a:defRPr/>
+            </a:pPr>
+            <a:r>
+              <a:rPr kumimoji="0" lang="en-US" sz="1200" b="0" i="0" u="none" strike="noStrike" kern="1200" cap="none" spc="0" normalizeH="0" baseline="0" noProof="0" dirty="0">
+                <a:ln>
+                  <a:noFill/>
+                </a:ln>
+                <a:solidFill>
+                  <a:srgbClr val="FF0000"/>
+                </a:solidFill>
+                <a:effectLst/>
+                <a:uLnTx/>
+                <a:uFillTx/>
+                <a:latin typeface="Calibri" panose="020F0502020204030204"/>
+                <a:ea typeface="+mn-ea"/>
+                <a:cs typeface="+mn-cs"/>
+              </a:rPr>
+              <a:t>T0: Bundle eICR.1 Sent (Optional*)</a:t>
+            </a:r>
+          </a:p>
+        </p:txBody>
+      </p:sp>
+      <p:cxnSp>
+        <p:nvCxnSpPr>
+          <p:cNvPr id="5" name="Elbow Connector 4">
+            <a:extLst>
+              <a:ext uri="{FF2B5EF4-FFF2-40B4-BE49-F238E27FC236}">
+                <a16:creationId xmlns:a16="http://schemas.microsoft.com/office/drawing/2014/main" id="{4E90BA67-955C-713A-5BD1-708C6502E4D1}"/>
+              </a:ext>
+            </a:extLst>
+          </p:cNvPr>
+          <p:cNvCxnSpPr>
+            <a:cxnSpLocks/>
+          </p:cNvCxnSpPr>
+          <p:nvPr/>
+        </p:nvCxnSpPr>
+        <p:spPr>
+          <a:xfrm rot="5400000" flipH="1" flipV="1">
+            <a:off x="-1167308" y="2836601"/>
+            <a:ext cx="3935412" cy="207674"/>
+          </a:xfrm>
+          <a:prstGeom prst="bentConnector2">
+            <a:avLst/>
+          </a:prstGeom>
+          <a:ln w="9525">
+            <a:solidFill>
+              <a:srgbClr val="FF0000"/>
+            </a:solidFill>
+            <a:tailEnd type="triangle"/>
+          </a:ln>
+        </p:spPr>
+        <p:style>
+          <a:lnRef idx="1">
+            <a:schemeClr val="accent1"/>
+          </a:lnRef>
+          <a:fillRef idx="0">
+            <a:schemeClr val="accent1"/>
+          </a:fillRef>
+          <a:effectRef idx="0">
+            <a:schemeClr val="accent1"/>
+          </a:effectRef>
+          <a:fontRef idx="minor">
+            <a:schemeClr val="tx1"/>
+          </a:fontRef>
+        </p:style>
+      </p:cxnSp>
+      <p:sp>
+        <p:nvSpPr>
+          <p:cNvPr id="2" name="TextBox 1">
+            <a:extLst>
+              <a:ext uri="{FF2B5EF4-FFF2-40B4-BE49-F238E27FC236}">
+                <a16:creationId xmlns:a16="http://schemas.microsoft.com/office/drawing/2014/main" id="{2AF9A334-1864-6F98-51A6-8B4981BBC8A2}"/>
+              </a:ext>
+            </a:extLst>
+          </p:cNvPr>
+          <p:cNvSpPr txBox="1"/>
+          <p:nvPr/>
+        </p:nvSpPr>
+        <p:spPr>
+          <a:xfrm>
+            <a:off x="549241" y="5746768"/>
+            <a:ext cx="8594135" cy="830997"/>
+          </a:xfrm>
+          <a:prstGeom prst="rect">
+            <a:avLst/>
+          </a:prstGeom>
+          <a:noFill/>
+        </p:spPr>
+        <p:txBody>
+          <a:bodyPr wrap="square" rtlCol="0">
+            <a:spAutoFit/>
+          </a:bodyPr>
+          <a:lstStyle/>
+          <a:p>
+            <a:pPr marL="0" marR="0" lvl="0" indent="0" algn="l" defTabSz="914400" rtl="0" eaLnBrk="1" fontAlgn="auto" latinLnBrk="0" hangingPunct="1">
+              <a:lnSpc>
+                <a:spcPct val="100000"/>
+              </a:lnSpc>
+              <a:spcBef>
+                <a:spcPts val="0"/>
+              </a:spcBef>
+              <a:spcAft>
+                <a:spcPts val="0"/>
+              </a:spcAft>
+              <a:buClrTx/>
+              <a:buSzTx/>
+              <a:buFontTx/>
+              <a:buNone/>
+              <a:tabLst/>
+              <a:defRPr/>
+            </a:pPr>
+            <a:r>
+              <a:rPr kumimoji="0" lang="en-US" sz="1200" b="0" i="0" u="none" strike="noStrike" kern="1200" cap="none" spc="0" normalizeH="0" baseline="0" noProof="0" dirty="0">
+                <a:ln>
+                  <a:noFill/>
+                </a:ln>
+                <a:solidFill>
+                  <a:prstClr val="black"/>
+                </a:solidFill>
+                <a:effectLst/>
+                <a:uLnTx/>
+                <a:uFillTx/>
+                <a:latin typeface="Calibri" panose="020F0502020204030204"/>
+                <a:ea typeface="+mn-ea"/>
+                <a:cs typeface="+mn-cs"/>
+              </a:rPr>
+              <a:t>Not shown: Encounters or other events that do not meet the CCRR IG triggering requirements.</a:t>
+            </a:r>
+          </a:p>
+          <a:p>
+            <a:pPr marL="0" marR="0" lvl="0" indent="0" algn="l" defTabSz="914400" rtl="0" eaLnBrk="1" fontAlgn="auto" latinLnBrk="0" hangingPunct="1">
+              <a:lnSpc>
+                <a:spcPct val="100000"/>
+              </a:lnSpc>
+              <a:spcBef>
+                <a:spcPts val="0"/>
+              </a:spcBef>
+              <a:spcAft>
+                <a:spcPts val="0"/>
+              </a:spcAft>
+              <a:buClrTx/>
+              <a:buSzTx/>
+              <a:buFontTx/>
+              <a:buNone/>
+              <a:tabLst/>
+              <a:defRPr/>
+            </a:pPr>
+            <a:endParaRPr kumimoji="0" lang="en-US" sz="1200" b="0" i="0" u="none" strike="noStrike" kern="1200" cap="none" spc="0" normalizeH="0" baseline="0" noProof="0" dirty="0">
+              <a:ln>
+                <a:noFill/>
+              </a:ln>
+              <a:solidFill>
+                <a:prstClr val="black"/>
+              </a:solidFill>
+              <a:effectLst/>
+              <a:uLnTx/>
+              <a:uFillTx/>
+              <a:latin typeface="Calibri" panose="020F0502020204030204"/>
+              <a:ea typeface="+mn-ea"/>
+              <a:cs typeface="+mn-cs"/>
+            </a:endParaRPr>
+          </a:p>
+          <a:p>
+            <a:pPr marL="0" marR="0" lvl="0" indent="0" algn="l" defTabSz="914400" rtl="0" eaLnBrk="1" fontAlgn="auto" latinLnBrk="0" hangingPunct="1">
+              <a:lnSpc>
+                <a:spcPct val="100000"/>
+              </a:lnSpc>
+              <a:spcBef>
+                <a:spcPts val="0"/>
+              </a:spcBef>
+              <a:spcAft>
+                <a:spcPts val="0"/>
+              </a:spcAft>
+              <a:buClrTx/>
+              <a:buSzTx/>
+              <a:buFontTx/>
+              <a:buNone/>
+              <a:tabLst/>
+              <a:defRPr/>
+            </a:pPr>
+            <a:r>
+              <a:rPr kumimoji="0" lang="en-US" sz="1200" b="0" i="0" u="none" strike="noStrike" kern="1200" cap="none" spc="0" normalizeH="0" baseline="0" noProof="0" dirty="0">
+                <a:ln>
+                  <a:noFill/>
+                </a:ln>
+                <a:solidFill>
+                  <a:prstClr val="black"/>
+                </a:solidFill>
+                <a:effectLst/>
+                <a:uLnTx/>
+                <a:uFillTx/>
+                <a:latin typeface="Calibri" panose="020F0502020204030204"/>
+                <a:ea typeface="+mn-ea"/>
+                <a:cs typeface="+mn-cs"/>
+              </a:rPr>
+              <a:t>* The content and triggers for an eICR bundle are specified in the Electronic Case Reporting (eCR) FHIR IG. Sending an eICR bundle is not required under the CCRR IG.</a:t>
+            </a:r>
+          </a:p>
+        </p:txBody>
+      </p:sp>
+    </p:spTree>
+    <p:extLst>
+      <p:ext uri="{BB962C8B-B14F-4D97-AF65-F5344CB8AC3E}">
+        <p14:creationId xmlns:p14="http://schemas.microsoft.com/office/powerpoint/2010/main" val="1648613127"/>
+      </p:ext>
+    </p:extLst>
+  </p:cSld>
+  <p:clrMapOvr>
+    <a:masterClrMapping/>
+  </p:clrMapOvr>
+</p:sld>
+</file>
+
 <file path=ppt/theme/theme1.xml><?xml version="1.0" encoding="utf-8"?>
 <a:theme xmlns:a="http://schemas.openxmlformats.org/drawingml/2006/main" name="ESAC Theme">
   <a:themeElements>

</xml_diff>